<commit_message>
Add software reference page
</commit_message>
<xml_diff>
--- a/julia_good_back_ugly.pptx
+++ b/julia_good_back_ugly.pptx
@@ -5,7 +5,7 @@
     <p:sldMasterId id="2147483648" r:id="rId1"/>
   </p:sldMasterIdLst>
   <p:notesMasterIdLst>
-    <p:notesMasterId r:id="rId48"/>
+    <p:notesMasterId r:id="rId49"/>
   </p:notesMasterIdLst>
   <p:sldIdLst>
     <p:sldId id="256" r:id="rId2"/>
@@ -54,6 +54,7 @@
     <p:sldId id="273" r:id="rId45"/>
     <p:sldId id="299" r:id="rId46"/>
     <p:sldId id="274" r:id="rId47"/>
+    <p:sldId id="359" r:id="rId48"/>
   </p:sldIdLst>
   <p:sldSz cx="12192000" cy="6858000"/>
   <p:notesSz cx="6858000" cy="9144000"/>
@@ -239,6 +240,7 @@
             <p14:sldId id="273"/>
             <p14:sldId id="299"/>
             <p14:sldId id="274"/>
+            <p14:sldId id="359"/>
           </p14:sldIdLst>
         </p14:section>
       </p14:sectionLst>
@@ -332,7 +334,7 @@
           <a:p>
             <a:fld id="{CC9F3EF1-84A5-42B0-81FF-8805AF740E8D}" type="datetimeFigureOut">
               <a:rPr lang="en-US" smtClean="0"/>
-              <a:t>2022-09-22</a:t>
+              <a:t>2022-11-23</a:t>
             </a:fld>
             <a:endParaRPr lang="en-US"/>
           </a:p>
@@ -746,7 +748,7 @@
           <a:p>
             <a:fld id="{0D45F18C-3E18-466F-8ADF-516304A44708}" type="datetime1">
               <a:rPr lang="en-US" smtClean="0"/>
-              <a:t>2022-09-22</a:t>
+              <a:t>2022-11-23</a:t>
             </a:fld>
             <a:endParaRPr lang="en-US"/>
           </a:p>
@@ -944,7 +946,7 @@
           <a:p>
             <a:fld id="{D5980222-6813-4CA6-84DC-753D8B88D809}" type="datetime1">
               <a:rPr lang="en-US" smtClean="0"/>
-              <a:t>2022-09-22</a:t>
+              <a:t>2022-11-23</a:t>
             </a:fld>
             <a:endParaRPr lang="en-US"/>
           </a:p>
@@ -1152,7 +1154,7 @@
           <a:p>
             <a:fld id="{96F7B8FF-A661-4CB7-BF06-F03D9C89262B}" type="datetime1">
               <a:rPr lang="en-US" smtClean="0"/>
-              <a:t>2022-09-22</a:t>
+              <a:t>2022-11-23</a:t>
             </a:fld>
             <a:endParaRPr lang="en-US"/>
           </a:p>
@@ -1350,7 +1352,7 @@
           <a:p>
             <a:fld id="{CE4E165D-6495-4D37-B27D-5DB6761319B2}" type="datetime1">
               <a:rPr lang="en-US" smtClean="0"/>
-              <a:t>2022-09-22</a:t>
+              <a:t>2022-11-23</a:t>
             </a:fld>
             <a:endParaRPr lang="en-US"/>
           </a:p>
@@ -1625,7 +1627,7 @@
           <a:p>
             <a:fld id="{579D02C7-69E9-4C82-8F80-CB6196DA722C}" type="datetime1">
               <a:rPr lang="en-US" smtClean="0"/>
-              <a:t>2022-09-22</a:t>
+              <a:t>2022-11-23</a:t>
             </a:fld>
             <a:endParaRPr lang="en-US"/>
           </a:p>
@@ -1890,7 +1892,7 @@
           <a:p>
             <a:fld id="{107E8C2C-E058-49BD-9DFF-244106208F3B}" type="datetime1">
               <a:rPr lang="en-US" smtClean="0"/>
-              <a:t>2022-09-22</a:t>
+              <a:t>2022-11-23</a:t>
             </a:fld>
             <a:endParaRPr lang="en-US"/>
           </a:p>
@@ -2302,7 +2304,7 @@
           <a:p>
             <a:fld id="{EBBE2EFD-4DA5-4354-BB09-551207F90777}" type="datetime1">
               <a:rPr lang="en-US" smtClean="0"/>
-              <a:t>2022-09-22</a:t>
+              <a:t>2022-11-23</a:t>
             </a:fld>
             <a:endParaRPr lang="en-US"/>
           </a:p>
@@ -2443,7 +2445,7 @@
           <a:p>
             <a:fld id="{0357F3B6-5D5B-4F6A-8ABC-6500847F3284}" type="datetime1">
               <a:rPr lang="en-US" smtClean="0"/>
-              <a:t>2022-09-22</a:t>
+              <a:t>2022-11-23</a:t>
             </a:fld>
             <a:endParaRPr lang="en-US"/>
           </a:p>
@@ -2556,7 +2558,7 @@
           <a:p>
             <a:fld id="{470EE9C1-5D95-4DE1-8B8E-CE731554AA23}" type="datetime1">
               <a:rPr lang="en-US" smtClean="0"/>
-              <a:t>2022-09-22</a:t>
+              <a:t>2022-11-23</a:t>
             </a:fld>
             <a:endParaRPr lang="en-US"/>
           </a:p>
@@ -2867,7 +2869,7 @@
           <a:p>
             <a:fld id="{ED4A0E8D-A460-4018-89F2-1FF6F9205C86}" type="datetime1">
               <a:rPr lang="en-US" smtClean="0"/>
-              <a:t>2022-09-22</a:t>
+              <a:t>2022-11-23</a:t>
             </a:fld>
             <a:endParaRPr lang="en-US"/>
           </a:p>
@@ -3155,7 +3157,7 @@
           <a:p>
             <a:fld id="{74076E25-3B53-45C6-AE55-8E3CC5E53EDE}" type="datetime1">
               <a:rPr lang="en-US" smtClean="0"/>
-              <a:t>2022-09-22</a:t>
+              <a:t>2022-11-23</a:t>
             </a:fld>
             <a:endParaRPr lang="en-US"/>
           </a:p>
@@ -3396,7 +3398,7 @@
           <a:p>
             <a:fld id="{3B0E2389-F93F-49F3-A6AD-79A456A600D1}" type="datetime1">
               <a:rPr lang="en-US" smtClean="0"/>
-              <a:t>2022-09-22</a:t>
+              <a:t>2022-11-23</a:t>
             </a:fld>
             <a:endParaRPr lang="en-US"/>
           </a:p>
@@ -31710,6 +31712,144 @@
 </p:sld>
 </file>
 
+<file path=ppt/slides/slide47.xml><?xml version="1.0" encoding="utf-8"?>
+<p:sld xmlns:a="http://schemas.openxmlformats.org/drawingml/2006/main" xmlns:r="http://schemas.openxmlformats.org/officeDocument/2006/relationships" xmlns:p="http://schemas.openxmlformats.org/presentationml/2006/main">
+  <p:cSld>
+    <p:spTree>
+      <p:nvGrpSpPr>
+        <p:cNvPr id="1" name=""/>
+        <p:cNvGrpSpPr/>
+        <p:nvPr/>
+      </p:nvGrpSpPr>
+      <p:grpSpPr>
+        <a:xfrm>
+          <a:off x="0" y="0"/>
+          <a:ext cx="0" cy="0"/>
+          <a:chOff x="0" y="0"/>
+          <a:chExt cx="0" cy="0"/>
+        </a:xfrm>
+      </p:grpSpPr>
+      <p:sp>
+        <p:nvSpPr>
+          <p:cNvPr id="2" name="Title 1">
+            <a:extLst>
+              <a:ext uri="{FF2B5EF4-FFF2-40B4-BE49-F238E27FC236}">
+                <a16:creationId xmlns:a16="http://schemas.microsoft.com/office/drawing/2014/main" id="{2C5A0FB5-DDBF-AC0A-228B-48A40DDC7058}"/>
+              </a:ext>
+            </a:extLst>
+          </p:cNvPr>
+          <p:cNvSpPr>
+            <a:spLocks noGrp="1"/>
+          </p:cNvSpPr>
+          <p:nvPr>
+            <p:ph type="title"/>
+          </p:nvPr>
+        </p:nvSpPr>
+        <p:spPr/>
+        <p:txBody>
+          <a:bodyPr/>
+          <a:lstStyle/>
+          <a:p>
+            <a:r>
+              <a:rPr lang="en-US" dirty="0"/>
+              <a:t>Software</a:t>
+            </a:r>
+            <a:endParaRPr lang="LID4096" dirty="0"/>
+          </a:p>
+        </p:txBody>
+      </p:sp>
+      <p:sp>
+        <p:nvSpPr>
+          <p:cNvPr id="3" name="Content Placeholder 2">
+            <a:extLst>
+              <a:ext uri="{FF2B5EF4-FFF2-40B4-BE49-F238E27FC236}">
+                <a16:creationId xmlns:a16="http://schemas.microsoft.com/office/drawing/2014/main" id="{28C604BA-9585-A7ED-0B84-D3477F529262}"/>
+              </a:ext>
+            </a:extLst>
+          </p:cNvPr>
+          <p:cNvSpPr>
+            <a:spLocks noGrp="1"/>
+          </p:cNvSpPr>
+          <p:nvPr>
+            <p:ph idx="1"/>
+          </p:nvPr>
+        </p:nvSpPr>
+        <p:spPr/>
+        <p:txBody>
+          <a:bodyPr/>
+          <a:lstStyle/>
+          <a:p>
+            <a:r>
+              <a:rPr lang="en-US" dirty="0"/>
+              <a:t>Google </a:t>
+            </a:r>
+            <a:r>
+              <a:rPr lang="en-US" dirty="0" err="1"/>
+              <a:t>Colab</a:t>
+            </a:r>
+            <a:r>
+              <a:rPr lang="en-US" dirty="0"/>
+              <a:t> template</a:t>
+            </a:r>
+            <a:br>
+              <a:rPr lang="en-US" dirty="0"/>
+            </a:br>
+            <a:r>
+              <a:rPr lang="en-US" sz="1600" dirty="0">
+                <a:hlinkClick r:id="rId2"/>
+              </a:rPr>
+              <a:t>https://colab.research.google.com/github/ageron/julia_notebooks/blob/master/Julia_Colab_Notebook_Template.ipynb</a:t>
+            </a:r>
+            <a:r>
+              <a:rPr lang="en-US" sz="1600" dirty="0"/>
+              <a:t> </a:t>
+            </a:r>
+            <a:endParaRPr lang="LID4096" dirty="0"/>
+          </a:p>
+        </p:txBody>
+      </p:sp>
+      <p:sp>
+        <p:nvSpPr>
+          <p:cNvPr id="4" name="Slide Number Placeholder 3">
+            <a:extLst>
+              <a:ext uri="{FF2B5EF4-FFF2-40B4-BE49-F238E27FC236}">
+                <a16:creationId xmlns:a16="http://schemas.microsoft.com/office/drawing/2014/main" id="{EFC9C216-3FDD-3468-8E30-D89BBEAB0C69}"/>
+              </a:ext>
+            </a:extLst>
+          </p:cNvPr>
+          <p:cNvSpPr>
+            <a:spLocks noGrp="1"/>
+          </p:cNvSpPr>
+          <p:nvPr>
+            <p:ph type="sldNum" sz="quarter" idx="12"/>
+          </p:nvPr>
+        </p:nvSpPr>
+        <p:spPr/>
+        <p:txBody>
+          <a:bodyPr/>
+          <a:lstStyle/>
+          <a:p>
+            <a:fld id="{78F7A1EC-23D1-431D-8C93-9C4ED5D4A04D}" type="slidenum">
+              <a:rPr lang="en-US" smtClean="0"/>
+              <a:t>47</a:t>
+            </a:fld>
+            <a:endParaRPr lang="en-US"/>
+          </a:p>
+        </p:txBody>
+      </p:sp>
+    </p:spTree>
+    <p:extLst>
+      <p:ext uri="{BB962C8B-B14F-4D97-AF65-F5344CB8AC3E}">
+        <p14:creationId xmlns:p14="http://schemas.microsoft.com/office/powerpoint/2010/main" val="1076162063"/>
+      </p:ext>
+    </p:extLst>
+  </p:cSld>
+  <p:clrMapOvr>
+    <a:masterClrMapping/>
+  </p:clrMapOvr>
+</p:sld>
+</file>
+
 <file path=ppt/slides/slide5.xml><?xml version="1.0" encoding="utf-8"?>
 <p:sld xmlns:a="http://schemas.openxmlformats.org/drawingml/2006/main" xmlns:r="http://schemas.openxmlformats.org/officeDocument/2006/relationships" xmlns:p="http://schemas.openxmlformats.org/presentationml/2006/main">
   <p:cSld>

</xml_diff>

<commit_message>
Add slide on how to run julia
</commit_message>
<xml_diff>
--- a/julia_good_back_ugly.pptx
+++ b/julia_good_back_ugly.pptx
@@ -5,7 +5,7 @@
     <p:sldMasterId id="2147483648" r:id="rId1"/>
   </p:sldMasterIdLst>
   <p:notesMasterIdLst>
-    <p:notesMasterId r:id="rId49"/>
+    <p:notesMasterId r:id="rId50"/>
   </p:notesMasterIdLst>
   <p:sldIdLst>
     <p:sldId id="256" r:id="rId2"/>
@@ -13,48 +13,49 @@
     <p:sldId id="356" r:id="rId4"/>
     <p:sldId id="357" r:id="rId5"/>
     <p:sldId id="257" r:id="rId6"/>
-    <p:sldId id="263" r:id="rId7"/>
-    <p:sldId id="275" r:id="rId8"/>
-    <p:sldId id="276" r:id="rId9"/>
-    <p:sldId id="265" r:id="rId10"/>
-    <p:sldId id="277" r:id="rId11"/>
-    <p:sldId id="283" r:id="rId12"/>
-    <p:sldId id="278" r:id="rId13"/>
-    <p:sldId id="284" r:id="rId14"/>
-    <p:sldId id="259" r:id="rId15"/>
-    <p:sldId id="258" r:id="rId16"/>
-    <p:sldId id="260" r:id="rId17"/>
-    <p:sldId id="262" r:id="rId18"/>
-    <p:sldId id="293" r:id="rId19"/>
-    <p:sldId id="264" r:id="rId20"/>
-    <p:sldId id="266" r:id="rId21"/>
-    <p:sldId id="282" r:id="rId22"/>
-    <p:sldId id="285" r:id="rId23"/>
-    <p:sldId id="286" r:id="rId24"/>
-    <p:sldId id="287" r:id="rId25"/>
-    <p:sldId id="288" r:id="rId26"/>
-    <p:sldId id="267" r:id="rId27"/>
-    <p:sldId id="268" r:id="rId28"/>
-    <p:sldId id="270" r:id="rId29"/>
-    <p:sldId id="269" r:id="rId30"/>
-    <p:sldId id="271" r:id="rId31"/>
-    <p:sldId id="272" r:id="rId32"/>
-    <p:sldId id="279" r:id="rId33"/>
-    <p:sldId id="294" r:id="rId34"/>
-    <p:sldId id="295" r:id="rId35"/>
-    <p:sldId id="296" r:id="rId36"/>
-    <p:sldId id="297" r:id="rId37"/>
-    <p:sldId id="280" r:id="rId38"/>
-    <p:sldId id="289" r:id="rId39"/>
-    <p:sldId id="290" r:id="rId40"/>
-    <p:sldId id="291" r:id="rId41"/>
-    <p:sldId id="281" r:id="rId42"/>
-    <p:sldId id="292" r:id="rId43"/>
-    <p:sldId id="298" r:id="rId44"/>
-    <p:sldId id="273" r:id="rId45"/>
-    <p:sldId id="299" r:id="rId46"/>
-    <p:sldId id="274" r:id="rId47"/>
-    <p:sldId id="359" r:id="rId48"/>
+    <p:sldId id="360" r:id="rId7"/>
+    <p:sldId id="263" r:id="rId8"/>
+    <p:sldId id="275" r:id="rId9"/>
+    <p:sldId id="276" r:id="rId10"/>
+    <p:sldId id="265" r:id="rId11"/>
+    <p:sldId id="277" r:id="rId12"/>
+    <p:sldId id="283" r:id="rId13"/>
+    <p:sldId id="278" r:id="rId14"/>
+    <p:sldId id="284" r:id="rId15"/>
+    <p:sldId id="259" r:id="rId16"/>
+    <p:sldId id="258" r:id="rId17"/>
+    <p:sldId id="260" r:id="rId18"/>
+    <p:sldId id="262" r:id="rId19"/>
+    <p:sldId id="293" r:id="rId20"/>
+    <p:sldId id="264" r:id="rId21"/>
+    <p:sldId id="266" r:id="rId22"/>
+    <p:sldId id="282" r:id="rId23"/>
+    <p:sldId id="285" r:id="rId24"/>
+    <p:sldId id="286" r:id="rId25"/>
+    <p:sldId id="287" r:id="rId26"/>
+    <p:sldId id="288" r:id="rId27"/>
+    <p:sldId id="267" r:id="rId28"/>
+    <p:sldId id="268" r:id="rId29"/>
+    <p:sldId id="270" r:id="rId30"/>
+    <p:sldId id="269" r:id="rId31"/>
+    <p:sldId id="271" r:id="rId32"/>
+    <p:sldId id="272" r:id="rId33"/>
+    <p:sldId id="279" r:id="rId34"/>
+    <p:sldId id="294" r:id="rId35"/>
+    <p:sldId id="295" r:id="rId36"/>
+    <p:sldId id="296" r:id="rId37"/>
+    <p:sldId id="297" r:id="rId38"/>
+    <p:sldId id="280" r:id="rId39"/>
+    <p:sldId id="289" r:id="rId40"/>
+    <p:sldId id="290" r:id="rId41"/>
+    <p:sldId id="291" r:id="rId42"/>
+    <p:sldId id="281" r:id="rId43"/>
+    <p:sldId id="292" r:id="rId44"/>
+    <p:sldId id="298" r:id="rId45"/>
+    <p:sldId id="273" r:id="rId46"/>
+    <p:sldId id="299" r:id="rId47"/>
+    <p:sldId id="274" r:id="rId48"/>
+    <p:sldId id="359" r:id="rId49"/>
   </p:sldIdLst>
   <p:sldSz cx="12192000" cy="6858000"/>
   <p:notesSz cx="6858000" cy="9144000"/>
@@ -167,6 +168,7 @@
             <p14:sldId id="356"/>
             <p14:sldId id="357"/>
             <p14:sldId id="257"/>
+            <p14:sldId id="360"/>
           </p14:sldIdLst>
         </p14:section>
         <p14:section name="Expressions" id="{1A4E6827-537E-4E05-80FF-E0FDC3AB42E1}">
@@ -334,7 +336,7 @@
           <a:p>
             <a:fld id="{CC9F3EF1-84A5-42B0-81FF-8805AF740E8D}" type="datetimeFigureOut">
               <a:rPr lang="en-US" smtClean="0"/>
-              <a:t>2022-11-23</a:t>
+              <a:t>2023-03-07</a:t>
             </a:fld>
             <a:endParaRPr lang="en-US"/>
           </a:p>
@@ -748,7 +750,7 @@
           <a:p>
             <a:fld id="{0D45F18C-3E18-466F-8ADF-516304A44708}" type="datetime1">
               <a:rPr lang="en-US" smtClean="0"/>
-              <a:t>2022-11-23</a:t>
+              <a:t>2023-03-07</a:t>
             </a:fld>
             <a:endParaRPr lang="en-US"/>
           </a:p>
@@ -946,7 +948,7 @@
           <a:p>
             <a:fld id="{D5980222-6813-4CA6-84DC-753D8B88D809}" type="datetime1">
               <a:rPr lang="en-US" smtClean="0"/>
-              <a:t>2022-11-23</a:t>
+              <a:t>2023-03-07</a:t>
             </a:fld>
             <a:endParaRPr lang="en-US"/>
           </a:p>
@@ -1154,7 +1156,7 @@
           <a:p>
             <a:fld id="{96F7B8FF-A661-4CB7-BF06-F03D9C89262B}" type="datetime1">
               <a:rPr lang="en-US" smtClean="0"/>
-              <a:t>2022-11-23</a:t>
+              <a:t>2023-03-07</a:t>
             </a:fld>
             <a:endParaRPr lang="en-US"/>
           </a:p>
@@ -1352,7 +1354,7 @@
           <a:p>
             <a:fld id="{CE4E165D-6495-4D37-B27D-5DB6761319B2}" type="datetime1">
               <a:rPr lang="en-US" smtClean="0"/>
-              <a:t>2022-11-23</a:t>
+              <a:t>2023-03-07</a:t>
             </a:fld>
             <a:endParaRPr lang="en-US"/>
           </a:p>
@@ -1627,7 +1629,7 @@
           <a:p>
             <a:fld id="{579D02C7-69E9-4C82-8F80-CB6196DA722C}" type="datetime1">
               <a:rPr lang="en-US" smtClean="0"/>
-              <a:t>2022-11-23</a:t>
+              <a:t>2023-03-07</a:t>
             </a:fld>
             <a:endParaRPr lang="en-US"/>
           </a:p>
@@ -1892,7 +1894,7 @@
           <a:p>
             <a:fld id="{107E8C2C-E058-49BD-9DFF-244106208F3B}" type="datetime1">
               <a:rPr lang="en-US" smtClean="0"/>
-              <a:t>2022-11-23</a:t>
+              <a:t>2023-03-07</a:t>
             </a:fld>
             <a:endParaRPr lang="en-US"/>
           </a:p>
@@ -2304,7 +2306,7 @@
           <a:p>
             <a:fld id="{EBBE2EFD-4DA5-4354-BB09-551207F90777}" type="datetime1">
               <a:rPr lang="en-US" smtClean="0"/>
-              <a:t>2022-11-23</a:t>
+              <a:t>2023-03-07</a:t>
             </a:fld>
             <a:endParaRPr lang="en-US"/>
           </a:p>
@@ -2445,7 +2447,7 @@
           <a:p>
             <a:fld id="{0357F3B6-5D5B-4F6A-8ABC-6500847F3284}" type="datetime1">
               <a:rPr lang="en-US" smtClean="0"/>
-              <a:t>2022-11-23</a:t>
+              <a:t>2023-03-07</a:t>
             </a:fld>
             <a:endParaRPr lang="en-US"/>
           </a:p>
@@ -2558,7 +2560,7 @@
           <a:p>
             <a:fld id="{470EE9C1-5D95-4DE1-8B8E-CE731554AA23}" type="datetime1">
               <a:rPr lang="en-US" smtClean="0"/>
-              <a:t>2022-11-23</a:t>
+              <a:t>2023-03-07</a:t>
             </a:fld>
             <a:endParaRPr lang="en-US"/>
           </a:p>
@@ -2869,7 +2871,7 @@
           <a:p>
             <a:fld id="{ED4A0E8D-A460-4018-89F2-1FF6F9205C86}" type="datetime1">
               <a:rPr lang="en-US" smtClean="0"/>
-              <a:t>2022-11-23</a:t>
+              <a:t>2023-03-07</a:t>
             </a:fld>
             <a:endParaRPr lang="en-US"/>
           </a:p>
@@ -3157,7 +3159,7 @@
           <a:p>
             <a:fld id="{74076E25-3B53-45C6-AE55-8E3CC5E53EDE}" type="datetime1">
               <a:rPr lang="en-US" smtClean="0"/>
-              <a:t>2022-11-23</a:t>
+              <a:t>2023-03-07</a:t>
             </a:fld>
             <a:endParaRPr lang="en-US"/>
           </a:p>
@@ -3398,7 +3400,7 @@
           <a:p>
             <a:fld id="{3B0E2389-F93F-49F3-A6AD-79A456A600D1}" type="datetime1">
               <a:rPr lang="en-US" smtClean="0"/>
-              <a:t>2022-11-23</a:t>
+              <a:t>2023-03-07</a:t>
             </a:fld>
             <a:endParaRPr lang="en-US"/>
           </a:p>
@@ -4057,6 +4059,118 @@
       </p:grpSpPr>
       <p:sp>
         <p:nvSpPr>
+          <p:cNvPr id="2" name="Title 1">
+            <a:extLst>
+              <a:ext uri="{FF2B5EF4-FFF2-40B4-BE49-F238E27FC236}">
+                <a16:creationId xmlns:a16="http://schemas.microsoft.com/office/drawing/2014/main" id="{5996CC12-00C7-483E-8CFF-7965D13CF81D}"/>
+              </a:ext>
+            </a:extLst>
+          </p:cNvPr>
+          <p:cNvSpPr>
+            <a:spLocks noGrp="1"/>
+          </p:cNvSpPr>
+          <p:nvPr>
+            <p:ph type="title"/>
+          </p:nvPr>
+        </p:nvSpPr>
+        <p:spPr/>
+        <p:txBody>
+          <a:bodyPr/>
+          <a:lstStyle/>
+          <a:p>
+            <a:r>
+              <a:rPr lang="en-US" dirty="0"/>
+              <a:t>Functions &amp; methods</a:t>
+            </a:r>
+          </a:p>
+        </p:txBody>
+      </p:sp>
+      <p:sp>
+        <p:nvSpPr>
+          <p:cNvPr id="3" name="Text Placeholder 2">
+            <a:extLst>
+              <a:ext uri="{FF2B5EF4-FFF2-40B4-BE49-F238E27FC236}">
+                <a16:creationId xmlns:a16="http://schemas.microsoft.com/office/drawing/2014/main" id="{4DBA96D6-590F-4DFD-8B92-2B05EA00B8D6}"/>
+              </a:ext>
+            </a:extLst>
+          </p:cNvPr>
+          <p:cNvSpPr>
+            <a:spLocks noGrp="1"/>
+          </p:cNvSpPr>
+          <p:nvPr>
+            <p:ph type="body" idx="1"/>
+          </p:nvPr>
+        </p:nvSpPr>
+        <p:spPr/>
+        <p:txBody>
+          <a:bodyPr/>
+          <a:lstStyle/>
+          <a:p>
+            <a:endParaRPr lang="en-US"/>
+          </a:p>
+        </p:txBody>
+      </p:sp>
+      <p:sp>
+        <p:nvSpPr>
+          <p:cNvPr id="4" name="Slide Number Placeholder 3">
+            <a:extLst>
+              <a:ext uri="{FF2B5EF4-FFF2-40B4-BE49-F238E27FC236}">
+                <a16:creationId xmlns:a16="http://schemas.microsoft.com/office/drawing/2014/main" id="{D4FDC261-61BA-4399-84EE-BBD1B46F99D2}"/>
+              </a:ext>
+            </a:extLst>
+          </p:cNvPr>
+          <p:cNvSpPr>
+            <a:spLocks noGrp="1"/>
+          </p:cNvSpPr>
+          <p:nvPr>
+            <p:ph type="sldNum" sz="quarter" idx="12"/>
+          </p:nvPr>
+        </p:nvSpPr>
+        <p:spPr/>
+        <p:txBody>
+          <a:bodyPr/>
+          <a:lstStyle/>
+          <a:p>
+            <a:fld id="{78F7A1EC-23D1-431D-8C93-9C4ED5D4A04D}" type="slidenum">
+              <a:rPr lang="en-US" smtClean="0"/>
+              <a:t>10</a:t>
+            </a:fld>
+            <a:endParaRPr lang="en-US"/>
+          </a:p>
+        </p:txBody>
+      </p:sp>
+    </p:spTree>
+    <p:extLst>
+      <p:ext uri="{BB962C8B-B14F-4D97-AF65-F5344CB8AC3E}">
+        <p14:creationId xmlns:p14="http://schemas.microsoft.com/office/powerpoint/2010/main" val="322722320"/>
+      </p:ext>
+    </p:extLst>
+  </p:cSld>
+  <p:clrMapOvr>
+    <a:masterClrMapping/>
+  </p:clrMapOvr>
+</p:sld>
+</file>
+
+<file path=ppt/slides/slide11.xml><?xml version="1.0" encoding="utf-8"?>
+<p:sld xmlns:a="http://schemas.openxmlformats.org/drawingml/2006/main" xmlns:r="http://schemas.openxmlformats.org/officeDocument/2006/relationships" xmlns:p="http://schemas.openxmlformats.org/presentationml/2006/main">
+  <p:cSld>
+    <p:spTree>
+      <p:nvGrpSpPr>
+        <p:cNvPr id="1" name=""/>
+        <p:cNvGrpSpPr/>
+        <p:nvPr/>
+      </p:nvGrpSpPr>
+      <p:grpSpPr>
+        <a:xfrm>
+          <a:off x="0" y="0"/>
+          <a:ext cx="0" cy="0"/>
+          <a:chOff x="0" y="0"/>
+          <a:chExt cx="0" cy="0"/>
+        </a:xfrm>
+      </p:grpSpPr>
+      <p:sp>
+        <p:nvSpPr>
           <p:cNvPr id="5" name="Title 4">
             <a:extLst>
               <a:ext uri="{FF2B5EF4-FFF2-40B4-BE49-F238E27FC236}">
@@ -4158,7 +4272,7 @@
           <a:p>
             <a:fld id="{78F7A1EC-23D1-431D-8C93-9C4ED5D4A04D}" type="slidenum">
               <a:rPr lang="en-US" smtClean="0"/>
-              <a:t>10</a:t>
+              <a:t>11</a:t>
             </a:fld>
             <a:endParaRPr lang="en-US"/>
           </a:p>
@@ -4878,7 +4992,7 @@
 </p:sld>
 </file>
 
-<file path=ppt/slides/slide11.xml><?xml version="1.0" encoding="utf-8"?>
+<file path=ppt/slides/slide12.xml><?xml version="1.0" encoding="utf-8"?>
 <p:sld xmlns:a="http://schemas.openxmlformats.org/drawingml/2006/main" xmlns:r="http://schemas.openxmlformats.org/officeDocument/2006/relationships" xmlns:p="http://schemas.openxmlformats.org/presentationml/2006/main">
   <p:cSld>
     <p:spTree>
@@ -4989,7 +5103,7 @@
           <a:p>
             <a:fld id="{78F7A1EC-23D1-431D-8C93-9C4ED5D4A04D}" type="slidenum">
               <a:rPr lang="en-US" smtClean="0"/>
-              <a:t>11</a:t>
+              <a:t>12</a:t>
             </a:fld>
             <a:endParaRPr lang="en-US"/>
           </a:p>
@@ -5879,7 +5993,7 @@
 </p:sld>
 </file>
 
-<file path=ppt/slides/slide12.xml><?xml version="1.0" encoding="utf-8"?>
+<file path=ppt/slides/slide13.xml><?xml version="1.0" encoding="utf-8"?>
 <p:sld xmlns:a="http://schemas.openxmlformats.org/drawingml/2006/main" xmlns:r="http://schemas.openxmlformats.org/officeDocument/2006/relationships" xmlns:p="http://schemas.openxmlformats.org/presentationml/2006/main">
   <p:cSld>
     <p:spTree>
@@ -5975,7 +6089,7 @@
           <a:p>
             <a:fld id="{78F7A1EC-23D1-431D-8C93-9C4ED5D4A04D}" type="slidenum">
               <a:rPr lang="en-US" smtClean="0"/>
-              <a:t>12</a:t>
+              <a:t>13</a:t>
             </a:fld>
             <a:endParaRPr lang="en-US"/>
           </a:p>
@@ -6869,7 +6983,7 @@
 </p:sld>
 </file>
 
-<file path=ppt/slides/slide13.xml><?xml version="1.0" encoding="utf-8"?>
+<file path=ppt/slides/slide14.xml><?xml version="1.0" encoding="utf-8"?>
 <p:sld xmlns:a="http://schemas.openxmlformats.org/drawingml/2006/main" xmlns:r="http://schemas.openxmlformats.org/officeDocument/2006/relationships" xmlns:p="http://schemas.openxmlformats.org/presentationml/2006/main">
   <p:cSld>
     <p:spTree>
@@ -6971,7 +7085,7 @@
           <a:p>
             <a:fld id="{78F7A1EC-23D1-431D-8C93-9C4ED5D4A04D}" type="slidenum">
               <a:rPr lang="en-US" smtClean="0"/>
-              <a:t>13</a:t>
+              <a:t>14</a:t>
             </a:fld>
             <a:endParaRPr lang="en-US"/>
           </a:p>
@@ -7277,7 +7391,7 @@
 </p:sld>
 </file>
 
-<file path=ppt/slides/slide14.xml><?xml version="1.0" encoding="utf-8"?>
+<file path=ppt/slides/slide15.xml><?xml version="1.0" encoding="utf-8"?>
 <p:sld xmlns:a="http://schemas.openxmlformats.org/drawingml/2006/main" xmlns:r="http://schemas.openxmlformats.org/officeDocument/2006/relationships" xmlns:p="http://schemas.openxmlformats.org/presentationml/2006/main">
   <p:cSld>
     <p:spTree>
@@ -7370,7 +7484,7 @@
           <a:p>
             <a:fld id="{78F7A1EC-23D1-431D-8C93-9C4ED5D4A04D}" type="slidenum">
               <a:rPr lang="en-US" smtClean="0"/>
-              <a:t>14</a:t>
+              <a:t>15</a:t>
             </a:fld>
             <a:endParaRPr lang="en-US"/>
           </a:p>
@@ -7389,7 +7503,7 @@
 </p:sld>
 </file>
 
-<file path=ppt/slides/slide15.xml><?xml version="1.0" encoding="utf-8"?>
+<file path=ppt/slides/slide16.xml><?xml version="1.0" encoding="utf-8"?>
 <p:sld xmlns:a="http://schemas.openxmlformats.org/drawingml/2006/main" xmlns:r="http://schemas.openxmlformats.org/officeDocument/2006/relationships" xmlns:p="http://schemas.openxmlformats.org/presentationml/2006/main">
   <p:cSld>
     <p:spTree>
@@ -7635,7 +7749,7 @@
           <a:p>
             <a:fld id="{78F7A1EC-23D1-431D-8C93-9C4ED5D4A04D}" type="slidenum">
               <a:rPr lang="en-US" smtClean="0"/>
-              <a:t>15</a:t>
+              <a:t>16</a:t>
             </a:fld>
             <a:endParaRPr lang="en-US"/>
           </a:p>
@@ -7732,7 +7846,7 @@
 </p:sld>
 </file>
 
-<file path=ppt/slides/slide16.xml><?xml version="1.0" encoding="utf-8"?>
+<file path=ppt/slides/slide17.xml><?xml version="1.0" encoding="utf-8"?>
 <p:sld xmlns:a="http://schemas.openxmlformats.org/drawingml/2006/main" xmlns:r="http://schemas.openxmlformats.org/officeDocument/2006/relationships" xmlns:p="http://schemas.openxmlformats.org/presentationml/2006/main">
   <p:cSld>
     <p:spTree>
@@ -8174,7 +8288,7 @@
           <a:p>
             <a:fld id="{78F7A1EC-23D1-431D-8C93-9C4ED5D4A04D}" type="slidenum">
               <a:rPr lang="en-US" smtClean="0"/>
-              <a:t>16</a:t>
+              <a:t>17</a:t>
             </a:fld>
             <a:endParaRPr lang="en-US"/>
           </a:p>
@@ -8409,7 +8523,7 @@
 </p:sld>
 </file>
 
-<file path=ppt/slides/slide17.xml><?xml version="1.0" encoding="utf-8"?>
+<file path=ppt/slides/slide18.xml><?xml version="1.0" encoding="utf-8"?>
 <p:sld xmlns:a="http://schemas.openxmlformats.org/drawingml/2006/main" xmlns:r="http://schemas.openxmlformats.org/officeDocument/2006/relationships" xmlns:p="http://schemas.openxmlformats.org/presentationml/2006/main">
   <p:cSld>
     <p:spTree>
@@ -8879,7 +8993,7 @@
           <a:p>
             <a:fld id="{78F7A1EC-23D1-431D-8C93-9C4ED5D4A04D}" type="slidenum">
               <a:rPr lang="en-US" smtClean="0"/>
-              <a:t>17</a:t>
+              <a:t>18</a:t>
             </a:fld>
             <a:endParaRPr lang="en-US"/>
           </a:p>
@@ -9257,7 +9371,7 @@
 </p:sld>
 </file>
 
-<file path=ppt/slides/slide18.xml><?xml version="1.0" encoding="utf-8"?>
+<file path=ppt/slides/slide19.xml><?xml version="1.0" encoding="utf-8"?>
 <p:sld xmlns:a="http://schemas.openxmlformats.org/drawingml/2006/main" xmlns:r="http://schemas.openxmlformats.org/officeDocument/2006/relationships" xmlns:p="http://schemas.openxmlformats.org/presentationml/2006/main">
   <p:cSld>
     <p:spTree>
@@ -9430,7 +9544,7 @@
           <a:p>
             <a:fld id="{78F7A1EC-23D1-431D-8C93-9C4ED5D4A04D}" type="slidenum">
               <a:rPr lang="en-US" smtClean="0"/>
-              <a:t>18</a:t>
+              <a:t>19</a:t>
             </a:fld>
             <a:endParaRPr lang="en-US"/>
           </a:p>
@@ -9879,118 +9993,6 @@
 </p:sld>
 </file>
 
-<file path=ppt/slides/slide19.xml><?xml version="1.0" encoding="utf-8"?>
-<p:sld xmlns:a="http://schemas.openxmlformats.org/drawingml/2006/main" xmlns:r="http://schemas.openxmlformats.org/officeDocument/2006/relationships" xmlns:p="http://schemas.openxmlformats.org/presentationml/2006/main">
-  <p:cSld>
-    <p:spTree>
-      <p:nvGrpSpPr>
-        <p:cNvPr id="1" name=""/>
-        <p:cNvGrpSpPr/>
-        <p:nvPr/>
-      </p:nvGrpSpPr>
-      <p:grpSpPr>
-        <a:xfrm>
-          <a:off x="0" y="0"/>
-          <a:ext cx="0" cy="0"/>
-          <a:chOff x="0" y="0"/>
-          <a:chExt cx="0" cy="0"/>
-        </a:xfrm>
-      </p:grpSpPr>
-      <p:sp>
-        <p:nvSpPr>
-          <p:cNvPr id="2" name="Title 1">
-            <a:extLst>
-              <a:ext uri="{FF2B5EF4-FFF2-40B4-BE49-F238E27FC236}">
-                <a16:creationId xmlns:a16="http://schemas.microsoft.com/office/drawing/2014/main" id="{2613194F-8BAA-4A07-BBA6-3D6B458520C2}"/>
-              </a:ext>
-            </a:extLst>
-          </p:cNvPr>
-          <p:cNvSpPr>
-            <a:spLocks noGrp="1"/>
-          </p:cNvSpPr>
-          <p:nvPr>
-            <p:ph type="title"/>
-          </p:nvPr>
-        </p:nvSpPr>
-        <p:spPr/>
-        <p:txBody>
-          <a:bodyPr/>
-          <a:lstStyle/>
-          <a:p>
-            <a:r>
-              <a:rPr lang="en-US" dirty="0"/>
-              <a:t>Data types</a:t>
-            </a:r>
-          </a:p>
-        </p:txBody>
-      </p:sp>
-      <p:sp>
-        <p:nvSpPr>
-          <p:cNvPr id="3" name="Text Placeholder 2">
-            <a:extLst>
-              <a:ext uri="{FF2B5EF4-FFF2-40B4-BE49-F238E27FC236}">
-                <a16:creationId xmlns:a16="http://schemas.microsoft.com/office/drawing/2014/main" id="{C2FFBE65-F98F-444F-B4B7-A70536D1013F}"/>
-              </a:ext>
-            </a:extLst>
-          </p:cNvPr>
-          <p:cNvSpPr>
-            <a:spLocks noGrp="1"/>
-          </p:cNvSpPr>
-          <p:nvPr>
-            <p:ph type="body" idx="1"/>
-          </p:nvPr>
-        </p:nvSpPr>
-        <p:spPr/>
-        <p:txBody>
-          <a:bodyPr/>
-          <a:lstStyle/>
-          <a:p>
-            <a:endParaRPr lang="en-US"/>
-          </a:p>
-        </p:txBody>
-      </p:sp>
-      <p:sp>
-        <p:nvSpPr>
-          <p:cNvPr id="4" name="Slide Number Placeholder 3">
-            <a:extLst>
-              <a:ext uri="{FF2B5EF4-FFF2-40B4-BE49-F238E27FC236}">
-                <a16:creationId xmlns:a16="http://schemas.microsoft.com/office/drawing/2014/main" id="{14CAC51D-39BD-4BAC-8555-31C8CF0E14DB}"/>
-              </a:ext>
-            </a:extLst>
-          </p:cNvPr>
-          <p:cNvSpPr>
-            <a:spLocks noGrp="1"/>
-          </p:cNvSpPr>
-          <p:nvPr>
-            <p:ph type="sldNum" sz="quarter" idx="12"/>
-          </p:nvPr>
-        </p:nvSpPr>
-        <p:spPr/>
-        <p:txBody>
-          <a:bodyPr/>
-          <a:lstStyle/>
-          <a:p>
-            <a:fld id="{78F7A1EC-23D1-431D-8C93-9C4ED5D4A04D}" type="slidenum">
-              <a:rPr lang="en-US" smtClean="0"/>
-              <a:t>19</a:t>
-            </a:fld>
-            <a:endParaRPr lang="en-US"/>
-          </a:p>
-        </p:txBody>
-      </p:sp>
-    </p:spTree>
-    <p:extLst>
-      <p:ext uri="{BB962C8B-B14F-4D97-AF65-F5344CB8AC3E}">
-        <p14:creationId xmlns:p14="http://schemas.microsoft.com/office/powerpoint/2010/main" val="2961179590"/>
-      </p:ext>
-    </p:extLst>
-  </p:cSld>
-  <p:clrMapOvr>
-    <a:masterClrMapping/>
-  </p:clrMapOvr>
-</p:sld>
-</file>
-
 <file path=ppt/slides/slide2.xml><?xml version="1.0" encoding="utf-8"?>
 <p:sld xmlns:a="http://schemas.openxmlformats.org/drawingml/2006/main" xmlns:r="http://schemas.openxmlformats.org/officeDocument/2006/relationships" xmlns:p="http://schemas.openxmlformats.org/presentationml/2006/main">
   <p:cSld>
@@ -10149,6 +10151,118 @@
           <p:cNvPr id="2" name="Title 1">
             <a:extLst>
               <a:ext uri="{FF2B5EF4-FFF2-40B4-BE49-F238E27FC236}">
+                <a16:creationId xmlns:a16="http://schemas.microsoft.com/office/drawing/2014/main" id="{2613194F-8BAA-4A07-BBA6-3D6B458520C2}"/>
+              </a:ext>
+            </a:extLst>
+          </p:cNvPr>
+          <p:cNvSpPr>
+            <a:spLocks noGrp="1"/>
+          </p:cNvSpPr>
+          <p:nvPr>
+            <p:ph type="title"/>
+          </p:nvPr>
+        </p:nvSpPr>
+        <p:spPr/>
+        <p:txBody>
+          <a:bodyPr/>
+          <a:lstStyle/>
+          <a:p>
+            <a:r>
+              <a:rPr lang="en-US" dirty="0"/>
+              <a:t>Data types</a:t>
+            </a:r>
+          </a:p>
+        </p:txBody>
+      </p:sp>
+      <p:sp>
+        <p:nvSpPr>
+          <p:cNvPr id="3" name="Text Placeholder 2">
+            <a:extLst>
+              <a:ext uri="{FF2B5EF4-FFF2-40B4-BE49-F238E27FC236}">
+                <a16:creationId xmlns:a16="http://schemas.microsoft.com/office/drawing/2014/main" id="{C2FFBE65-F98F-444F-B4B7-A70536D1013F}"/>
+              </a:ext>
+            </a:extLst>
+          </p:cNvPr>
+          <p:cNvSpPr>
+            <a:spLocks noGrp="1"/>
+          </p:cNvSpPr>
+          <p:nvPr>
+            <p:ph type="body" idx="1"/>
+          </p:nvPr>
+        </p:nvSpPr>
+        <p:spPr/>
+        <p:txBody>
+          <a:bodyPr/>
+          <a:lstStyle/>
+          <a:p>
+            <a:endParaRPr lang="en-US"/>
+          </a:p>
+        </p:txBody>
+      </p:sp>
+      <p:sp>
+        <p:nvSpPr>
+          <p:cNvPr id="4" name="Slide Number Placeholder 3">
+            <a:extLst>
+              <a:ext uri="{FF2B5EF4-FFF2-40B4-BE49-F238E27FC236}">
+                <a16:creationId xmlns:a16="http://schemas.microsoft.com/office/drawing/2014/main" id="{14CAC51D-39BD-4BAC-8555-31C8CF0E14DB}"/>
+              </a:ext>
+            </a:extLst>
+          </p:cNvPr>
+          <p:cNvSpPr>
+            <a:spLocks noGrp="1"/>
+          </p:cNvSpPr>
+          <p:nvPr>
+            <p:ph type="sldNum" sz="quarter" idx="12"/>
+          </p:nvPr>
+        </p:nvSpPr>
+        <p:spPr/>
+        <p:txBody>
+          <a:bodyPr/>
+          <a:lstStyle/>
+          <a:p>
+            <a:fld id="{78F7A1EC-23D1-431D-8C93-9C4ED5D4A04D}" type="slidenum">
+              <a:rPr lang="en-US" smtClean="0"/>
+              <a:t>20</a:t>
+            </a:fld>
+            <a:endParaRPr lang="en-US"/>
+          </a:p>
+        </p:txBody>
+      </p:sp>
+    </p:spTree>
+    <p:extLst>
+      <p:ext uri="{BB962C8B-B14F-4D97-AF65-F5344CB8AC3E}">
+        <p14:creationId xmlns:p14="http://schemas.microsoft.com/office/powerpoint/2010/main" val="2961179590"/>
+      </p:ext>
+    </p:extLst>
+  </p:cSld>
+  <p:clrMapOvr>
+    <a:masterClrMapping/>
+  </p:clrMapOvr>
+</p:sld>
+</file>
+
+<file path=ppt/slides/slide21.xml><?xml version="1.0" encoding="utf-8"?>
+<p:sld xmlns:a="http://schemas.openxmlformats.org/drawingml/2006/main" xmlns:r="http://schemas.openxmlformats.org/officeDocument/2006/relationships" xmlns:p="http://schemas.openxmlformats.org/presentationml/2006/main">
+  <p:cSld>
+    <p:spTree>
+      <p:nvGrpSpPr>
+        <p:cNvPr id="1" name=""/>
+        <p:cNvGrpSpPr/>
+        <p:nvPr/>
+      </p:nvGrpSpPr>
+      <p:grpSpPr>
+        <a:xfrm>
+          <a:off x="0" y="0"/>
+          <a:ext cx="0" cy="0"/>
+          <a:chOff x="0" y="0"/>
+          <a:chExt cx="0" cy="0"/>
+        </a:xfrm>
+      </p:grpSpPr>
+      <p:sp>
+        <p:nvSpPr>
+          <p:cNvPr id="2" name="Title 1">
+            <a:extLst>
+              <a:ext uri="{FF2B5EF4-FFF2-40B4-BE49-F238E27FC236}">
                 <a16:creationId xmlns:a16="http://schemas.microsoft.com/office/drawing/2014/main" id="{DE8AF62F-AC75-4212-9AE7-C283CD4CDC59}"/>
               </a:ext>
             </a:extLst>
@@ -10469,7 +10583,7 @@
           <a:p>
             <a:fld id="{78F7A1EC-23D1-431D-8C93-9C4ED5D4A04D}" type="slidenum">
               <a:rPr lang="en-US" smtClean="0"/>
-              <a:t>20</a:t>
+              <a:t>21</a:t>
             </a:fld>
             <a:endParaRPr lang="en-US"/>
           </a:p>
@@ -11750,7 +11864,7 @@
 </p:sld>
 </file>
 
-<file path=ppt/slides/slide21.xml><?xml version="1.0" encoding="utf-8"?>
+<file path=ppt/slides/slide22.xml><?xml version="1.0" encoding="utf-8"?>
 <p:sld xmlns:a="http://schemas.openxmlformats.org/drawingml/2006/main" xmlns:r="http://schemas.openxmlformats.org/officeDocument/2006/relationships" xmlns:p="http://schemas.openxmlformats.org/presentationml/2006/main">
   <p:cSld>
     <p:spTree>
@@ -12140,7 +12254,7 @@
           <a:p>
             <a:fld id="{78F7A1EC-23D1-431D-8C93-9C4ED5D4A04D}" type="slidenum">
               <a:rPr lang="en-US" smtClean="0"/>
-              <a:t>21</a:t>
+              <a:t>22</a:t>
             </a:fld>
             <a:endParaRPr lang="en-US"/>
           </a:p>
@@ -13215,7 +13329,7 @@
 </p:sld>
 </file>
 
-<file path=ppt/slides/slide22.xml><?xml version="1.0" encoding="utf-8"?>
+<file path=ppt/slides/slide23.xml><?xml version="1.0" encoding="utf-8"?>
 <p:sld xmlns:a="http://schemas.openxmlformats.org/drawingml/2006/main" xmlns:r="http://schemas.openxmlformats.org/officeDocument/2006/relationships" xmlns:p="http://schemas.openxmlformats.org/presentationml/2006/main">
   <p:cSld>
     <p:spTree>
@@ -13355,7 +13469,7 @@
           <a:p>
             <a:fld id="{78F7A1EC-23D1-431D-8C93-9C4ED5D4A04D}" type="slidenum">
               <a:rPr lang="en-US" smtClean="0"/>
-              <a:t>22</a:t>
+              <a:t>23</a:t>
             </a:fld>
             <a:endParaRPr lang="en-US"/>
           </a:p>
@@ -13766,7 +13880,7 @@
 </p:sld>
 </file>
 
-<file path=ppt/slides/slide23.xml><?xml version="1.0" encoding="utf-8"?>
+<file path=ppt/slides/slide24.xml><?xml version="1.0" encoding="utf-8"?>
 <p:sld xmlns:a="http://schemas.openxmlformats.org/drawingml/2006/main" xmlns:r="http://schemas.openxmlformats.org/officeDocument/2006/relationships" xmlns:p="http://schemas.openxmlformats.org/presentationml/2006/main">
   <p:cSld>
     <p:spTree>
@@ -13897,7 +14011,7 @@
           <a:p>
             <a:fld id="{78F7A1EC-23D1-431D-8C93-9C4ED5D4A04D}" type="slidenum">
               <a:rPr lang="en-US" smtClean="0"/>
-              <a:t>23</a:t>
+              <a:t>24</a:t>
             </a:fld>
             <a:endParaRPr lang="en-US"/>
           </a:p>
@@ -14973,7 +15087,7 @@
 </p:sld>
 </file>
 
-<file path=ppt/slides/slide24.xml><?xml version="1.0" encoding="utf-8"?>
+<file path=ppt/slides/slide25.xml><?xml version="1.0" encoding="utf-8"?>
 <p:sld xmlns:a="http://schemas.openxmlformats.org/drawingml/2006/main" xmlns:r="http://schemas.openxmlformats.org/officeDocument/2006/relationships" xmlns:p="http://schemas.openxmlformats.org/presentationml/2006/main">
   <p:cSld>
     <p:spTree>
@@ -15215,7 +15329,7 @@
           <a:p>
             <a:fld id="{78F7A1EC-23D1-431D-8C93-9C4ED5D4A04D}" type="slidenum">
               <a:rPr lang="en-US" smtClean="0"/>
-              <a:t>24</a:t>
+              <a:t>25</a:t>
             </a:fld>
             <a:endParaRPr lang="en-US"/>
           </a:p>
@@ -16715,7 +16829,7 @@
 </p:sld>
 </file>
 
-<file path=ppt/slides/slide25.xml><?xml version="1.0" encoding="utf-8"?>
+<file path=ppt/slides/slide26.xml><?xml version="1.0" encoding="utf-8"?>
 <p:sld xmlns:a="http://schemas.openxmlformats.org/drawingml/2006/main" xmlns:r="http://schemas.openxmlformats.org/officeDocument/2006/relationships" xmlns:p="http://schemas.openxmlformats.org/presentationml/2006/main">
   <p:cSld>
     <p:spTree>
@@ -17100,7 +17214,7 @@
           <a:p>
             <a:fld id="{78F7A1EC-23D1-431D-8C93-9C4ED5D4A04D}" type="slidenum">
               <a:rPr lang="en-US" smtClean="0"/>
-              <a:t>25</a:t>
+              <a:t>26</a:t>
             </a:fld>
             <a:endParaRPr lang="en-US"/>
           </a:p>
@@ -17940,7 +18054,7 @@
 </p:sld>
 </file>
 
-<file path=ppt/slides/slide26.xml><?xml version="1.0" encoding="utf-8"?>
+<file path=ppt/slides/slide27.xml><?xml version="1.0" encoding="utf-8"?>
 <p:sld xmlns:a="http://schemas.openxmlformats.org/drawingml/2006/main" xmlns:r="http://schemas.openxmlformats.org/officeDocument/2006/relationships" xmlns:p="http://schemas.openxmlformats.org/presentationml/2006/main">
   <p:cSld>
     <p:spTree>
@@ -18872,7 +18986,7 @@
           <a:p>
             <a:fld id="{78F7A1EC-23D1-431D-8C93-9C4ED5D4A04D}" type="slidenum">
               <a:rPr lang="en-US" smtClean="0"/>
-              <a:t>26</a:t>
+              <a:t>27</a:t>
             </a:fld>
             <a:endParaRPr lang="en-US"/>
           </a:p>
@@ -19286,7 +19400,7 @@
 </p:sld>
 </file>
 
-<file path=ppt/slides/slide27.xml><?xml version="1.0" encoding="utf-8"?>
+<file path=ppt/slides/slide28.xml><?xml version="1.0" encoding="utf-8"?>
 <p:sld xmlns:a="http://schemas.openxmlformats.org/drawingml/2006/main" xmlns:r="http://schemas.openxmlformats.org/officeDocument/2006/relationships" xmlns:p="http://schemas.openxmlformats.org/presentationml/2006/main">
   <p:cSld>
     <p:spTree>
@@ -19718,7 +19832,7 @@
           <a:p>
             <a:fld id="{78F7A1EC-23D1-431D-8C93-9C4ED5D4A04D}" type="slidenum">
               <a:rPr lang="en-US" smtClean="0"/>
-              <a:t>27</a:t>
+              <a:t>28</a:t>
             </a:fld>
             <a:endParaRPr lang="en-US"/>
           </a:p>
@@ -20114,7 +20228,7 @@
 </p:sld>
 </file>
 
-<file path=ppt/slides/slide28.xml><?xml version="1.0" encoding="utf-8"?>
+<file path=ppt/slides/slide29.xml><?xml version="1.0" encoding="utf-8"?>
 <p:sld xmlns:a="http://schemas.openxmlformats.org/drawingml/2006/main" xmlns:r="http://schemas.openxmlformats.org/officeDocument/2006/relationships" xmlns:p="http://schemas.openxmlformats.org/presentationml/2006/main">
   <p:cSld>
     <p:spTree>
@@ -20182,7 +20296,7 @@
           <a:p>
             <a:fld id="{78F7A1EC-23D1-431D-8C93-9C4ED5D4A04D}" type="slidenum">
               <a:rPr lang="en-US" smtClean="0"/>
-              <a:t>28</a:t>
+              <a:t>29</a:t>
             </a:fld>
             <a:endParaRPr lang="en-US"/>
           </a:p>
@@ -20693,7 +20807,73 @@
 </p:sld>
 </file>
 
-<file path=ppt/slides/slide29.xml><?xml version="1.0" encoding="utf-8"?>
+<file path=ppt/slides/slide3.xml><?xml version="1.0" encoding="utf-8"?>
+<p:sld xmlns:a="http://schemas.openxmlformats.org/drawingml/2006/main" xmlns:r="http://schemas.openxmlformats.org/officeDocument/2006/relationships" xmlns:p="http://schemas.openxmlformats.org/presentationml/2006/main">
+  <p:cSld>
+    <p:spTree>
+      <p:nvGrpSpPr>
+        <p:cNvPr id="1" name=""/>
+        <p:cNvGrpSpPr/>
+        <p:nvPr/>
+      </p:nvGrpSpPr>
+      <p:grpSpPr>
+        <a:xfrm>
+          <a:off x="0" y="0"/>
+          <a:ext cx="0" cy="0"/>
+          <a:chOff x="0" y="0"/>
+          <a:chExt cx="0" cy="0"/>
+        </a:xfrm>
+      </p:grpSpPr>
+      <p:pic>
+        <p:nvPicPr>
+          <p:cNvPr id="3" name="Picture 2">
+            <a:extLst>
+              <a:ext uri="{FF2B5EF4-FFF2-40B4-BE49-F238E27FC236}">
+                <a16:creationId xmlns:a16="http://schemas.microsoft.com/office/drawing/2014/main" id="{D4C8B7CA-974B-4F39-B507-75A5AE9BED89}"/>
+              </a:ext>
+            </a:extLst>
+          </p:cNvPr>
+          <p:cNvPicPr>
+            <a:picLocks noChangeAspect="1"/>
+          </p:cNvPicPr>
+          <p:nvPr/>
+        </p:nvPicPr>
+        <p:blipFill>
+          <a:blip r:embed="rId2">
+            <a:extLst>
+              <a:ext uri="{28A0092B-C50C-407E-A947-70E740481C1C}">
+                <a14:useLocalDpi xmlns:a14="http://schemas.microsoft.com/office/drawing/2010/main" val="0"/>
+              </a:ext>
+            </a:extLst>
+          </a:blip>
+          <a:stretch>
+            <a:fillRect/>
+          </a:stretch>
+        </p:blipFill>
+        <p:spPr>
+          <a:xfrm>
+            <a:off x="0" y="0"/>
+            <a:ext cx="12192000" cy="6858000"/>
+          </a:xfrm>
+          <a:prstGeom prst="rect">
+            <a:avLst/>
+          </a:prstGeom>
+        </p:spPr>
+      </p:pic>
+    </p:spTree>
+    <p:extLst>
+      <p:ext uri="{BB962C8B-B14F-4D97-AF65-F5344CB8AC3E}">
+        <p14:creationId xmlns:p14="http://schemas.microsoft.com/office/powerpoint/2010/main" val="1618968533"/>
+      </p:ext>
+    </p:extLst>
+  </p:cSld>
+  <p:clrMapOvr>
+    <a:masterClrMapping/>
+  </p:clrMapOvr>
+</p:sld>
+</file>
+
+<file path=ppt/slides/slide30.xml><?xml version="1.0" encoding="utf-8"?>
 <p:sld xmlns:a="http://schemas.openxmlformats.org/drawingml/2006/main" xmlns:r="http://schemas.openxmlformats.org/officeDocument/2006/relationships" xmlns:p="http://schemas.openxmlformats.org/presentationml/2006/main">
   <p:cSld>
     <p:spTree>
@@ -21055,7 +21235,7 @@
           <a:p>
             <a:fld id="{78F7A1EC-23D1-431D-8C93-9C4ED5D4A04D}" type="slidenum">
               <a:rPr lang="en-US" smtClean="0"/>
-              <a:t>29</a:t>
+              <a:t>30</a:t>
             </a:fld>
             <a:endParaRPr lang="en-US"/>
           </a:p>
@@ -21152,73 +21332,7 @@
 </p:sld>
 </file>
 
-<file path=ppt/slides/slide3.xml><?xml version="1.0" encoding="utf-8"?>
-<p:sld xmlns:a="http://schemas.openxmlformats.org/drawingml/2006/main" xmlns:r="http://schemas.openxmlformats.org/officeDocument/2006/relationships" xmlns:p="http://schemas.openxmlformats.org/presentationml/2006/main">
-  <p:cSld>
-    <p:spTree>
-      <p:nvGrpSpPr>
-        <p:cNvPr id="1" name=""/>
-        <p:cNvGrpSpPr/>
-        <p:nvPr/>
-      </p:nvGrpSpPr>
-      <p:grpSpPr>
-        <a:xfrm>
-          <a:off x="0" y="0"/>
-          <a:ext cx="0" cy="0"/>
-          <a:chOff x="0" y="0"/>
-          <a:chExt cx="0" cy="0"/>
-        </a:xfrm>
-      </p:grpSpPr>
-      <p:pic>
-        <p:nvPicPr>
-          <p:cNvPr id="3" name="Picture 2">
-            <a:extLst>
-              <a:ext uri="{FF2B5EF4-FFF2-40B4-BE49-F238E27FC236}">
-                <a16:creationId xmlns:a16="http://schemas.microsoft.com/office/drawing/2014/main" id="{D4C8B7CA-974B-4F39-B507-75A5AE9BED89}"/>
-              </a:ext>
-            </a:extLst>
-          </p:cNvPr>
-          <p:cNvPicPr>
-            <a:picLocks noChangeAspect="1"/>
-          </p:cNvPicPr>
-          <p:nvPr/>
-        </p:nvPicPr>
-        <p:blipFill>
-          <a:blip r:embed="rId2">
-            <a:extLst>
-              <a:ext uri="{28A0092B-C50C-407E-A947-70E740481C1C}">
-                <a14:useLocalDpi xmlns:a14="http://schemas.microsoft.com/office/drawing/2010/main" val="0"/>
-              </a:ext>
-            </a:extLst>
-          </a:blip>
-          <a:stretch>
-            <a:fillRect/>
-          </a:stretch>
-        </p:blipFill>
-        <p:spPr>
-          <a:xfrm>
-            <a:off x="0" y="0"/>
-            <a:ext cx="12192000" cy="6858000"/>
-          </a:xfrm>
-          <a:prstGeom prst="rect">
-            <a:avLst/>
-          </a:prstGeom>
-        </p:spPr>
-      </p:pic>
-    </p:spTree>
-    <p:extLst>
-      <p:ext uri="{BB962C8B-B14F-4D97-AF65-F5344CB8AC3E}">
-        <p14:creationId xmlns:p14="http://schemas.microsoft.com/office/powerpoint/2010/main" val="1618968533"/>
-      </p:ext>
-    </p:extLst>
-  </p:cSld>
-  <p:clrMapOvr>
-    <a:masterClrMapping/>
-  </p:clrMapOvr>
-</p:sld>
-</file>
-
-<file path=ppt/slides/slide30.xml><?xml version="1.0" encoding="utf-8"?>
+<file path=ppt/slides/slide31.xml><?xml version="1.0" encoding="utf-8"?>
 <p:sld xmlns:a="http://schemas.openxmlformats.org/drawingml/2006/main" xmlns:r="http://schemas.openxmlformats.org/officeDocument/2006/relationships" xmlns:p="http://schemas.openxmlformats.org/presentationml/2006/main">
   <p:cSld>
     <p:spTree>
@@ -21519,7 +21633,7 @@
           <a:p>
             <a:fld id="{78F7A1EC-23D1-431D-8C93-9C4ED5D4A04D}" type="slidenum">
               <a:rPr lang="en-US" smtClean="0"/>
-              <a:t>30</a:t>
+              <a:t>31</a:t>
             </a:fld>
             <a:endParaRPr lang="en-US"/>
           </a:p>
@@ -21921,7 +22035,7 @@
 </p:sld>
 </file>
 
-<file path=ppt/slides/slide31.xml><?xml version="1.0" encoding="utf-8"?>
+<file path=ppt/slides/slide32.xml><?xml version="1.0" encoding="utf-8"?>
 <p:sld xmlns:a="http://schemas.openxmlformats.org/drawingml/2006/main" xmlns:r="http://schemas.openxmlformats.org/officeDocument/2006/relationships" xmlns:p="http://schemas.openxmlformats.org/presentationml/2006/main">
   <p:cSld>
     <p:spTree>
@@ -22035,7 +22149,7 @@
           <a:p>
             <a:fld id="{78F7A1EC-23D1-431D-8C93-9C4ED5D4A04D}" type="slidenum">
               <a:rPr lang="en-US" smtClean="0"/>
-              <a:t>31</a:t>
+              <a:t>32</a:t>
             </a:fld>
             <a:endParaRPr lang="en-US"/>
           </a:p>
@@ -23588,7 +23702,7 @@
 </p:sld>
 </file>
 
-<file path=ppt/slides/slide32.xml><?xml version="1.0" encoding="utf-8"?>
+<file path=ppt/slides/slide33.xml><?xml version="1.0" encoding="utf-8"?>
 <p:sld xmlns:a="http://schemas.openxmlformats.org/drawingml/2006/main" xmlns:r="http://schemas.openxmlformats.org/officeDocument/2006/relationships" xmlns:p="http://schemas.openxmlformats.org/presentationml/2006/main">
   <p:cSld>
     <p:spTree>
@@ -23711,7 +23825,7 @@
           <a:p>
             <a:fld id="{78F7A1EC-23D1-431D-8C93-9C4ED5D4A04D}" type="slidenum">
               <a:rPr lang="en-US" smtClean="0"/>
-              <a:t>32</a:t>
+              <a:t>33</a:t>
             </a:fld>
             <a:endParaRPr lang="en-US"/>
           </a:p>
@@ -24187,7 +24301,7 @@
 </p:sld>
 </file>
 
-<file path=ppt/slides/slide33.xml><?xml version="1.0" encoding="utf-8"?>
+<file path=ppt/slides/slide34.xml><?xml version="1.0" encoding="utf-8"?>
 <p:sld xmlns:a="http://schemas.openxmlformats.org/drawingml/2006/main" xmlns:r="http://schemas.openxmlformats.org/officeDocument/2006/relationships" xmlns:p="http://schemas.openxmlformats.org/presentationml/2006/main">
   <p:cSld>
     <p:spTree>
@@ -24280,7 +24394,7 @@
           <a:p>
             <a:fld id="{78F7A1EC-23D1-431D-8C93-9C4ED5D4A04D}" type="slidenum">
               <a:rPr lang="en-US" smtClean="0"/>
-              <a:t>33</a:t>
+              <a:t>34</a:t>
             </a:fld>
             <a:endParaRPr lang="en-US"/>
           </a:p>
@@ -24299,7 +24413,7 @@
 </p:sld>
 </file>
 
-<file path=ppt/slides/slide34.xml><?xml version="1.0" encoding="utf-8"?>
+<file path=ppt/slides/slide35.xml><?xml version="1.0" encoding="utf-8"?>
 <p:sld xmlns:a="http://schemas.openxmlformats.org/drawingml/2006/main" xmlns:r="http://schemas.openxmlformats.org/officeDocument/2006/relationships" xmlns:p="http://schemas.openxmlformats.org/presentationml/2006/main">
   <p:cSld>
     <p:spTree>
@@ -24429,7 +24543,7 @@
           <a:p>
             <a:fld id="{78F7A1EC-23D1-431D-8C93-9C4ED5D4A04D}" type="slidenum">
               <a:rPr lang="en-US" smtClean="0"/>
-              <a:t>34</a:t>
+              <a:t>35</a:t>
             </a:fld>
             <a:endParaRPr lang="en-US"/>
           </a:p>
@@ -25165,7 +25279,7 @@
 </p:sld>
 </file>
 
-<file path=ppt/slides/slide35.xml><?xml version="1.0" encoding="utf-8"?>
+<file path=ppt/slides/slide36.xml><?xml version="1.0" encoding="utf-8"?>
 <p:sld xmlns:a="http://schemas.openxmlformats.org/drawingml/2006/main" xmlns:r="http://schemas.openxmlformats.org/officeDocument/2006/relationships" xmlns:p="http://schemas.openxmlformats.org/presentationml/2006/main">
   <p:cSld>
     <p:spTree>
@@ -25233,7 +25347,7 @@
           <a:p>
             <a:fld id="{78F7A1EC-23D1-431D-8C93-9C4ED5D4A04D}" type="slidenum">
               <a:rPr lang="en-US" smtClean="0"/>
-              <a:t>35</a:t>
+              <a:t>36</a:t>
             </a:fld>
             <a:endParaRPr lang="en-US"/>
           </a:p>
@@ -25496,7 +25610,7 @@
 </p:sld>
 </file>
 
-<file path=ppt/slides/slide36.xml><?xml version="1.0" encoding="utf-8"?>
+<file path=ppt/slides/slide37.xml><?xml version="1.0" encoding="utf-8"?>
 <p:sld xmlns:a="http://schemas.openxmlformats.org/drawingml/2006/main" xmlns:r="http://schemas.openxmlformats.org/officeDocument/2006/relationships" xmlns:p="http://schemas.openxmlformats.org/presentationml/2006/main">
   <p:cSld>
     <p:spTree>
@@ -25628,7 +25742,7 @@
           <a:p>
             <a:fld id="{78F7A1EC-23D1-431D-8C93-9C4ED5D4A04D}" type="slidenum">
               <a:rPr lang="en-US" smtClean="0"/>
-              <a:t>36</a:t>
+              <a:t>37</a:t>
             </a:fld>
             <a:endParaRPr lang="en-US"/>
           </a:p>
@@ -25830,7 +25944,7 @@
 </p:sld>
 </file>
 
-<file path=ppt/slides/slide37.xml><?xml version="1.0" encoding="utf-8"?>
+<file path=ppt/slides/slide38.xml><?xml version="1.0" encoding="utf-8"?>
 <p:sld xmlns:a="http://schemas.openxmlformats.org/drawingml/2006/main" xmlns:r="http://schemas.openxmlformats.org/officeDocument/2006/relationships" xmlns:p="http://schemas.openxmlformats.org/presentationml/2006/main">
   <p:cSld>
     <p:spTree>
@@ -25923,7 +26037,7 @@
           <a:p>
             <a:fld id="{78F7A1EC-23D1-431D-8C93-9C4ED5D4A04D}" type="slidenum">
               <a:rPr lang="en-US" smtClean="0"/>
-              <a:t>37</a:t>
+              <a:t>38</a:t>
             </a:fld>
             <a:endParaRPr lang="en-US"/>
           </a:p>
@@ -25942,7 +26056,7 @@
 </p:sld>
 </file>
 
-<file path=ppt/slides/slide38.xml><?xml version="1.0" encoding="utf-8"?>
+<file path=ppt/slides/slide39.xml><?xml version="1.0" encoding="utf-8"?>
 <p:sld xmlns:a="http://schemas.openxmlformats.org/drawingml/2006/main" xmlns:r="http://schemas.openxmlformats.org/officeDocument/2006/relationships" xmlns:p="http://schemas.openxmlformats.org/presentationml/2006/main">
   <p:cSld>
     <p:spTree>
@@ -26038,7 +26152,7 @@
           <a:p>
             <a:fld id="{78F7A1EC-23D1-431D-8C93-9C4ED5D4A04D}" type="slidenum">
               <a:rPr lang="en-US" smtClean="0"/>
-              <a:t>38</a:t>
+              <a:t>39</a:t>
             </a:fld>
             <a:endParaRPr lang="en-US"/>
           </a:p>
@@ -27356,644 +27470,6 @@
     <p:bldLst>
       <p:bldP spid="20" grpId="0" animBg="1"/>
       <p:bldP spid="24" grpId="0" animBg="1"/>
-    </p:bldLst>
-  </p:timing>
-</p:sld>
-</file>
-
-<file path=ppt/slides/slide39.xml><?xml version="1.0" encoding="utf-8"?>
-<p:sld xmlns:a="http://schemas.openxmlformats.org/drawingml/2006/main" xmlns:r="http://schemas.openxmlformats.org/officeDocument/2006/relationships" xmlns:p="http://schemas.openxmlformats.org/presentationml/2006/main">
-  <p:cSld>
-    <p:spTree>
-      <p:nvGrpSpPr>
-        <p:cNvPr id="1" name=""/>
-        <p:cNvGrpSpPr/>
-        <p:nvPr/>
-      </p:nvGrpSpPr>
-      <p:grpSpPr>
-        <a:xfrm>
-          <a:off x="0" y="0"/>
-          <a:ext cx="0" cy="0"/>
-          <a:chOff x="0" y="0"/>
-          <a:chExt cx="0" cy="0"/>
-        </a:xfrm>
-      </p:grpSpPr>
-      <p:sp>
-        <p:nvSpPr>
-          <p:cNvPr id="2" name="Title 1">
-            <a:extLst>
-              <a:ext uri="{FF2B5EF4-FFF2-40B4-BE49-F238E27FC236}">
-                <a16:creationId xmlns:a16="http://schemas.microsoft.com/office/drawing/2014/main" id="{55AC2C90-DDC5-486E-9507-4F3418F774CF}"/>
-              </a:ext>
-            </a:extLst>
-          </p:cNvPr>
-          <p:cNvSpPr>
-            <a:spLocks noGrp="1"/>
-          </p:cNvSpPr>
-          <p:nvPr>
-            <p:ph type="title"/>
-          </p:nvPr>
-        </p:nvSpPr>
-        <p:spPr/>
-        <p:txBody>
-          <a:bodyPr/>
-          <a:lstStyle/>
-          <a:p>
-            <a:r>
-              <a:rPr lang="en-US" dirty="0"/>
-              <a:t>Packages</a:t>
-            </a:r>
-          </a:p>
-        </p:txBody>
-      </p:sp>
-      <p:sp>
-        <p:nvSpPr>
-          <p:cNvPr id="3" name="Content Placeholder 2">
-            <a:extLst>
-              <a:ext uri="{FF2B5EF4-FFF2-40B4-BE49-F238E27FC236}">
-                <a16:creationId xmlns:a16="http://schemas.microsoft.com/office/drawing/2014/main" id="{B1198834-D6EA-4D93-B5A0-29171C47F1C7}"/>
-              </a:ext>
-            </a:extLst>
-          </p:cNvPr>
-          <p:cNvSpPr>
-            <a:spLocks noGrp="1"/>
-          </p:cNvSpPr>
-          <p:nvPr>
-            <p:ph idx="1"/>
-          </p:nvPr>
-        </p:nvSpPr>
-        <p:spPr/>
-        <p:txBody>
-          <a:bodyPr/>
-          <a:lstStyle/>
-          <a:p>
-            <a:r>
-              <a:rPr lang="en-US" dirty="0"/>
-              <a:t>Minimal package </a:t>
-            </a:r>
-            <a:r>
-              <a:rPr lang="en-US" dirty="0" err="1">
-                <a:latin typeface="Consolas" panose="020B0609020204030204" pitchFamily="49" charset="0"/>
-              </a:rPr>
-              <a:t>Gcd</a:t>
-            </a:r>
-            <a:endParaRPr lang="en-US" dirty="0">
-              <a:latin typeface="Consolas" panose="020B0609020204030204" pitchFamily="49" charset="0"/>
-            </a:endParaRPr>
-          </a:p>
-          <a:p>
-            <a:pPr lvl="1"/>
-            <a:endParaRPr lang="en-US" dirty="0"/>
-          </a:p>
-        </p:txBody>
-      </p:sp>
-      <p:sp>
-        <p:nvSpPr>
-          <p:cNvPr id="4" name="Slide Number Placeholder 3">
-            <a:extLst>
-              <a:ext uri="{FF2B5EF4-FFF2-40B4-BE49-F238E27FC236}">
-                <a16:creationId xmlns:a16="http://schemas.microsoft.com/office/drawing/2014/main" id="{76CD2ADE-9DFA-42E6-BC97-9CB864E0E6BF}"/>
-              </a:ext>
-            </a:extLst>
-          </p:cNvPr>
-          <p:cNvSpPr>
-            <a:spLocks noGrp="1"/>
-          </p:cNvSpPr>
-          <p:nvPr>
-            <p:ph type="sldNum" sz="quarter" idx="12"/>
-          </p:nvPr>
-        </p:nvSpPr>
-        <p:spPr/>
-        <p:txBody>
-          <a:bodyPr/>
-          <a:lstStyle/>
-          <a:p>
-            <a:fld id="{78F7A1EC-23D1-431D-8C93-9C4ED5D4A04D}" type="slidenum">
-              <a:rPr lang="en-US" smtClean="0"/>
-              <a:t>39</a:t>
-            </a:fld>
-            <a:endParaRPr lang="en-US"/>
-          </a:p>
-        </p:txBody>
-      </p:sp>
-      <p:grpSp>
-        <p:nvGrpSpPr>
-          <p:cNvPr id="7" name="Group 6">
-            <a:extLst>
-              <a:ext uri="{FF2B5EF4-FFF2-40B4-BE49-F238E27FC236}">
-                <a16:creationId xmlns:a16="http://schemas.microsoft.com/office/drawing/2014/main" id="{FABA1504-2F36-4CD8-B7C1-ABB5958246C4}"/>
-              </a:ext>
-            </a:extLst>
-          </p:cNvPr>
-          <p:cNvGrpSpPr/>
-          <p:nvPr/>
-        </p:nvGrpSpPr>
-        <p:grpSpPr>
-          <a:xfrm>
-            <a:off x="4624557" y="3536606"/>
-            <a:ext cx="7122600" cy="1200329"/>
-            <a:chOff x="838200" y="2455198"/>
-            <a:chExt cx="7122600" cy="1200329"/>
-          </a:xfrm>
-        </p:grpSpPr>
-        <p:sp>
-          <p:nvSpPr>
-            <p:cNvPr id="8" name="TextBox 7">
-              <a:extLst>
-                <a:ext uri="{FF2B5EF4-FFF2-40B4-BE49-F238E27FC236}">
-                  <a16:creationId xmlns:a16="http://schemas.microsoft.com/office/drawing/2014/main" id="{CA88DB7D-1186-4B6B-B509-84E8EFC9F006}"/>
-                </a:ext>
-              </a:extLst>
-            </p:cNvPr>
-            <p:cNvSpPr txBox="1"/>
-            <p:nvPr/>
-          </p:nvSpPr>
-          <p:spPr>
-            <a:xfrm>
-              <a:off x="838200" y="2455198"/>
-              <a:ext cx="7122600" cy="1200329"/>
-            </a:xfrm>
-            <a:prstGeom prst="rect">
-              <a:avLst/>
-            </a:prstGeom>
-            <a:solidFill>
-              <a:schemeClr val="bg1">
-                <a:lumMod val="85000"/>
-              </a:schemeClr>
-            </a:solidFill>
-          </p:spPr>
-          <p:txBody>
-            <a:bodyPr wrap="square" rtlCol="0">
-              <a:spAutoFit/>
-            </a:bodyPr>
-            <a:lstStyle/>
-            <a:p>
-              <a:r>
-                <a:rPr lang="en-US" dirty="0">
-                  <a:latin typeface="Consolas" panose="020B0609020204030204" pitchFamily="49" charset="0"/>
-                </a:rPr>
-                <a:t>name = "</a:t>
-              </a:r>
-              <a:r>
-                <a:rPr lang="en-US" dirty="0" err="1">
-                  <a:latin typeface="Consolas" panose="020B0609020204030204" pitchFamily="49" charset="0"/>
-                </a:rPr>
-                <a:t>Gcd</a:t>
-              </a:r>
-              <a:r>
-                <a:rPr lang="en-US" dirty="0">
-                  <a:latin typeface="Consolas" panose="020B0609020204030204" pitchFamily="49" charset="0"/>
-                </a:rPr>
-                <a:t>"</a:t>
-              </a:r>
-            </a:p>
-            <a:p>
-              <a:r>
-                <a:rPr lang="en-US" dirty="0" err="1">
-                  <a:latin typeface="Consolas" panose="020B0609020204030204" pitchFamily="49" charset="0"/>
-                </a:rPr>
-                <a:t>uuid</a:t>
-              </a:r>
-              <a:r>
-                <a:rPr lang="en-US" dirty="0">
-                  <a:latin typeface="Consolas" panose="020B0609020204030204" pitchFamily="49" charset="0"/>
-                </a:rPr>
-                <a:t> = "6101a580-870c-4971-a759-bb25a2f00590"</a:t>
-              </a:r>
-            </a:p>
-            <a:p>
-              <a:r>
-                <a:rPr lang="en-US" dirty="0">
-                  <a:latin typeface="Consolas" panose="020B0609020204030204" pitchFamily="49" charset="0"/>
-                </a:rPr>
-                <a:t>authors = ["Geert Jan Bex &lt;geertjan.bex@uhasselt.be&gt;"]</a:t>
-              </a:r>
-            </a:p>
-            <a:p>
-              <a:r>
-                <a:rPr lang="en-US" dirty="0">
-                  <a:latin typeface="Consolas" panose="020B0609020204030204" pitchFamily="49" charset="0"/>
-                </a:rPr>
-                <a:t>version = "0.1.0"</a:t>
-              </a:r>
-            </a:p>
-          </p:txBody>
-        </p:sp>
-        <p:sp>
-          <p:nvSpPr>
-            <p:cNvPr id="9" name="TextBox 8">
-              <a:extLst>
-                <a:ext uri="{FF2B5EF4-FFF2-40B4-BE49-F238E27FC236}">
-                  <a16:creationId xmlns:a16="http://schemas.microsoft.com/office/drawing/2014/main" id="{EDE038DF-3332-4C06-ADCC-AB3BFD0EC7E4}"/>
-                </a:ext>
-              </a:extLst>
-            </p:cNvPr>
-            <p:cNvSpPr txBox="1"/>
-            <p:nvPr/>
-          </p:nvSpPr>
-          <p:spPr>
-            <a:xfrm>
-              <a:off x="7057064" y="3384864"/>
-              <a:ext cx="889987" cy="261610"/>
-            </a:xfrm>
-            <a:prstGeom prst="rect">
-              <a:avLst/>
-            </a:prstGeom>
-            <a:solidFill>
-              <a:schemeClr val="bg1"/>
-            </a:solidFill>
-            <a:ln>
-              <a:solidFill>
-                <a:schemeClr val="tx1"/>
-              </a:solidFill>
-            </a:ln>
-          </p:spPr>
-          <p:txBody>
-            <a:bodyPr wrap="none" rtlCol="0">
-              <a:spAutoFit/>
-            </a:bodyPr>
-            <a:lstStyle/>
-            <a:p>
-              <a:r>
-                <a:rPr lang="en-US" sz="1100" dirty="0" err="1"/>
-                <a:t>Project.tmol</a:t>
-              </a:r>
-              <a:endParaRPr lang="en-US" sz="1100" dirty="0"/>
-            </a:p>
-          </p:txBody>
-        </p:sp>
-      </p:grpSp>
-      <p:sp>
-        <p:nvSpPr>
-          <p:cNvPr id="10" name="TextBox 9">
-            <a:extLst>
-              <a:ext uri="{FF2B5EF4-FFF2-40B4-BE49-F238E27FC236}">
-                <a16:creationId xmlns:a16="http://schemas.microsoft.com/office/drawing/2014/main" id="{93D8DF2F-DAD4-45C9-BE67-1101395542A5}"/>
-              </a:ext>
-            </a:extLst>
-          </p:cNvPr>
-          <p:cNvSpPr txBox="1"/>
-          <p:nvPr/>
-        </p:nvSpPr>
-        <p:spPr>
-          <a:xfrm>
-            <a:off x="1492463" y="2496450"/>
-            <a:ext cx="2305172" cy="369332"/>
-          </a:xfrm>
-          <a:prstGeom prst="rect">
-            <a:avLst/>
-          </a:prstGeom>
-          <a:solidFill>
-            <a:schemeClr val="tx1"/>
-          </a:solidFill>
-        </p:spPr>
-        <p:txBody>
-          <a:bodyPr wrap="square" rtlCol="0">
-            <a:spAutoFit/>
-          </a:bodyPr>
-          <a:lstStyle/>
-          <a:p>
-            <a:r>
-              <a:rPr lang="en-US" b="1" dirty="0">
-                <a:solidFill>
-                  <a:schemeClr val="bg1"/>
-                </a:solidFill>
-              </a:rPr>
-              <a:t>pkg&gt; generate </a:t>
-            </a:r>
-            <a:r>
-              <a:rPr lang="en-US" b="1" dirty="0" err="1">
-                <a:solidFill>
-                  <a:schemeClr val="bg1"/>
-                </a:solidFill>
-              </a:rPr>
-              <a:t>Gcd</a:t>
-            </a:r>
-            <a:endParaRPr lang="en-US" b="1" dirty="0">
-              <a:solidFill>
-                <a:schemeClr val="bg1"/>
-              </a:solidFill>
-            </a:endParaRPr>
-          </a:p>
-        </p:txBody>
-      </p:sp>
-      <p:grpSp>
-        <p:nvGrpSpPr>
-          <p:cNvPr id="5" name="Group 4">
-            <a:extLst>
-              <a:ext uri="{FF2B5EF4-FFF2-40B4-BE49-F238E27FC236}">
-                <a16:creationId xmlns:a16="http://schemas.microsoft.com/office/drawing/2014/main" id="{81092623-75C1-4D86-9324-75CCF3BFFAA3}"/>
-              </a:ext>
-            </a:extLst>
-          </p:cNvPr>
-          <p:cNvGrpSpPr/>
-          <p:nvPr/>
-        </p:nvGrpSpPr>
-        <p:grpSpPr>
-          <a:xfrm>
-            <a:off x="1492464" y="2981413"/>
-            <a:ext cx="2305176" cy="1763423"/>
-            <a:chOff x="1492464" y="2981413"/>
-            <a:chExt cx="2305176" cy="1763423"/>
-          </a:xfrm>
-        </p:grpSpPr>
-        <p:pic>
-          <p:nvPicPr>
-            <p:cNvPr id="6" name="Picture 5">
-              <a:extLst>
-                <a:ext uri="{FF2B5EF4-FFF2-40B4-BE49-F238E27FC236}">
-                  <a16:creationId xmlns:a16="http://schemas.microsoft.com/office/drawing/2014/main" id="{81586ECD-7D08-460B-959E-FA6E06707932}"/>
-                </a:ext>
-              </a:extLst>
-            </p:cNvPr>
-            <p:cNvPicPr>
-              <a:picLocks noChangeAspect="1"/>
-            </p:cNvPicPr>
-            <p:nvPr/>
-          </p:nvPicPr>
-          <p:blipFill>
-            <a:blip r:embed="rId2"/>
-            <a:stretch>
-              <a:fillRect/>
-            </a:stretch>
-          </p:blipFill>
-          <p:spPr>
-            <a:xfrm>
-              <a:off x="1492464" y="3536606"/>
-              <a:ext cx="2305176" cy="1208230"/>
-            </a:xfrm>
-            <a:prstGeom prst="rect">
-              <a:avLst/>
-            </a:prstGeom>
-          </p:spPr>
-        </p:pic>
-        <p:cxnSp>
-          <p:nvCxnSpPr>
-            <p:cNvPr id="11" name="Straight Arrow Connector 10">
-              <a:extLst>
-                <a:ext uri="{FF2B5EF4-FFF2-40B4-BE49-F238E27FC236}">
-                  <a16:creationId xmlns:a16="http://schemas.microsoft.com/office/drawing/2014/main" id="{54D693ED-BB43-4463-A5C9-FC7AD066AF1A}"/>
-                </a:ext>
-              </a:extLst>
-            </p:cNvPr>
-            <p:cNvCxnSpPr>
-              <a:cxnSpLocks/>
-            </p:cNvCxnSpPr>
-            <p:nvPr/>
-          </p:nvCxnSpPr>
-          <p:spPr>
-            <a:xfrm rot="5400000">
-              <a:off x="2569856" y="3179122"/>
-              <a:ext cx="395417" cy="0"/>
-            </a:xfrm>
-            <a:prstGeom prst="straightConnector1">
-              <a:avLst/>
-            </a:prstGeom>
-            <a:ln w="38100">
-              <a:solidFill>
-                <a:schemeClr val="tx1"/>
-              </a:solidFill>
-              <a:tailEnd type="stealth" w="lg" len="lg"/>
-            </a:ln>
-          </p:spPr>
-          <p:style>
-            <a:lnRef idx="1">
-              <a:schemeClr val="accent1"/>
-            </a:lnRef>
-            <a:fillRef idx="0">
-              <a:schemeClr val="accent1"/>
-            </a:fillRef>
-            <a:effectRef idx="0">
-              <a:schemeClr val="accent1"/>
-            </a:effectRef>
-            <a:fontRef idx="minor">
-              <a:schemeClr val="tx1"/>
-            </a:fontRef>
-          </p:style>
-        </p:cxnSp>
-      </p:grpSp>
-      <p:sp>
-        <p:nvSpPr>
-          <p:cNvPr id="12" name="TextBox 11">
-            <a:extLst>
-              <a:ext uri="{FF2B5EF4-FFF2-40B4-BE49-F238E27FC236}">
-                <a16:creationId xmlns:a16="http://schemas.microsoft.com/office/drawing/2014/main" id="{FF705B03-BE6A-4F88-A45C-E7D83A8B84D0}"/>
-              </a:ext>
-            </a:extLst>
-          </p:cNvPr>
-          <p:cNvSpPr txBox="1"/>
-          <p:nvPr/>
-        </p:nvSpPr>
-        <p:spPr>
-          <a:xfrm>
-            <a:off x="3534032" y="5410782"/>
-            <a:ext cx="7266092" cy="461665"/>
-          </a:xfrm>
-          <a:prstGeom prst="rect">
-            <a:avLst/>
-          </a:prstGeom>
-          <a:noFill/>
-          <a:ln>
-            <a:solidFill>
-              <a:schemeClr val="tx1"/>
-            </a:solidFill>
-          </a:ln>
-        </p:spPr>
-        <p:txBody>
-          <a:bodyPr wrap="none" rtlCol="0">
-            <a:spAutoFit/>
-          </a:bodyPr>
-          <a:lstStyle/>
-          <a:p>
-            <a:r>
-              <a:rPr lang="en-US" sz="2400" dirty="0"/>
-              <a:t>Ensure project parent directory is in </a:t>
-            </a:r>
-            <a:r>
-              <a:rPr lang="en-US" sz="2400" dirty="0">
-                <a:latin typeface="Consolas" panose="020B0609020204030204" pitchFamily="49" charset="0"/>
-              </a:rPr>
-              <a:t>JULIA_LOAD_PATH</a:t>
-            </a:r>
-          </a:p>
-        </p:txBody>
-      </p:sp>
-    </p:spTree>
-    <p:extLst>
-      <p:ext uri="{BB962C8B-B14F-4D97-AF65-F5344CB8AC3E}">
-        <p14:creationId xmlns:p14="http://schemas.microsoft.com/office/powerpoint/2010/main" val="243560851"/>
-      </p:ext>
-    </p:extLst>
-  </p:cSld>
-  <p:clrMapOvr>
-    <a:masterClrMapping/>
-  </p:clrMapOvr>
-  <p:timing>
-    <p:tnLst>
-      <p:par>
-        <p:cTn id="1" dur="indefinite" restart="never" nodeType="tmRoot">
-          <p:childTnLst>
-            <p:seq concurrent="1" nextAc="seek">
-              <p:cTn id="2" dur="indefinite" nodeType="mainSeq">
-                <p:childTnLst>
-                  <p:par>
-                    <p:cTn id="3" fill="hold">
-                      <p:stCondLst>
-                        <p:cond delay="indefinite"/>
-                      </p:stCondLst>
-                      <p:childTnLst>
-                        <p:par>
-                          <p:cTn id="4" fill="hold">
-                            <p:stCondLst>
-                              <p:cond delay="0"/>
-                            </p:stCondLst>
-                            <p:childTnLst>
-                              <p:par>
-                                <p:cTn id="5" presetID="1" presetClass="entr" presetSubtype="0" fill="hold" nodeType="clickEffect">
-                                  <p:stCondLst>
-                                    <p:cond delay="0"/>
-                                  </p:stCondLst>
-                                  <p:childTnLst>
-                                    <p:set>
-                                      <p:cBhvr>
-                                        <p:cTn id="6" dur="1" fill="hold">
-                                          <p:stCondLst>
-                                            <p:cond delay="0"/>
-                                          </p:stCondLst>
-                                        </p:cTn>
-                                        <p:tgtEl>
-                                          <p:spTgt spid="5"/>
-                                        </p:tgtEl>
-                                        <p:attrNameLst>
-                                          <p:attrName>style.visibility</p:attrName>
-                                        </p:attrNameLst>
-                                      </p:cBhvr>
-                                      <p:to>
-                                        <p:strVal val="visible"/>
-                                      </p:to>
-                                    </p:set>
-                                  </p:childTnLst>
-                                </p:cTn>
-                              </p:par>
-                            </p:childTnLst>
-                          </p:cTn>
-                        </p:par>
-                      </p:childTnLst>
-                    </p:cTn>
-                  </p:par>
-                  <p:par>
-                    <p:cTn id="7" fill="hold">
-                      <p:stCondLst>
-                        <p:cond delay="indefinite"/>
-                      </p:stCondLst>
-                      <p:childTnLst>
-                        <p:par>
-                          <p:cTn id="8" fill="hold">
-                            <p:stCondLst>
-                              <p:cond delay="0"/>
-                            </p:stCondLst>
-                            <p:childTnLst>
-                              <p:par>
-                                <p:cTn id="9" presetID="1" presetClass="entr" presetSubtype="0" fill="hold" nodeType="clickEffect">
-                                  <p:stCondLst>
-                                    <p:cond delay="0"/>
-                                  </p:stCondLst>
-                                  <p:childTnLst>
-                                    <p:set>
-                                      <p:cBhvr>
-                                        <p:cTn id="10" dur="1" fill="hold">
-                                          <p:stCondLst>
-                                            <p:cond delay="0"/>
-                                          </p:stCondLst>
-                                        </p:cTn>
-                                        <p:tgtEl>
-                                          <p:spTgt spid="7"/>
-                                        </p:tgtEl>
-                                        <p:attrNameLst>
-                                          <p:attrName>style.visibility</p:attrName>
-                                        </p:attrNameLst>
-                                      </p:cBhvr>
-                                      <p:to>
-                                        <p:strVal val="visible"/>
-                                      </p:to>
-                                    </p:set>
-                                  </p:childTnLst>
-                                </p:cTn>
-                              </p:par>
-                            </p:childTnLst>
-                          </p:cTn>
-                        </p:par>
-                      </p:childTnLst>
-                    </p:cTn>
-                  </p:par>
-                  <p:par>
-                    <p:cTn id="11" fill="hold">
-                      <p:stCondLst>
-                        <p:cond delay="indefinite"/>
-                      </p:stCondLst>
-                      <p:childTnLst>
-                        <p:par>
-                          <p:cTn id="12" fill="hold">
-                            <p:stCondLst>
-                              <p:cond delay="0"/>
-                            </p:stCondLst>
-                            <p:childTnLst>
-                              <p:par>
-                                <p:cTn id="13" presetID="1" presetClass="entr" presetSubtype="0" fill="hold" grpId="0" nodeType="clickEffect">
-                                  <p:stCondLst>
-                                    <p:cond delay="0"/>
-                                  </p:stCondLst>
-                                  <p:childTnLst>
-                                    <p:set>
-                                      <p:cBhvr>
-                                        <p:cTn id="14" dur="1" fill="hold">
-                                          <p:stCondLst>
-                                            <p:cond delay="0"/>
-                                          </p:stCondLst>
-                                        </p:cTn>
-                                        <p:tgtEl>
-                                          <p:spTgt spid="12"/>
-                                        </p:tgtEl>
-                                        <p:attrNameLst>
-                                          <p:attrName>style.visibility</p:attrName>
-                                        </p:attrNameLst>
-                                      </p:cBhvr>
-                                      <p:to>
-                                        <p:strVal val="visible"/>
-                                      </p:to>
-                                    </p:set>
-                                  </p:childTnLst>
-                                </p:cTn>
-                              </p:par>
-                            </p:childTnLst>
-                          </p:cTn>
-                        </p:par>
-                      </p:childTnLst>
-                    </p:cTn>
-                  </p:par>
-                </p:childTnLst>
-              </p:cTn>
-              <p:prevCondLst>
-                <p:cond evt="onPrev" delay="0">
-                  <p:tgtEl>
-                    <p:sldTgt/>
-                  </p:tgtEl>
-                </p:cond>
-              </p:prevCondLst>
-              <p:nextCondLst>
-                <p:cond evt="onNext" delay="0">
-                  <p:tgtEl>
-                    <p:sldTgt/>
-                  </p:tgtEl>
-                </p:cond>
-              </p:nextCondLst>
-            </p:seq>
-          </p:childTnLst>
-        </p:cTn>
-      </p:par>
-    </p:tnLst>
-    <p:bldLst>
-      <p:bldP spid="12" grpId="0" animBg="1"/>
     </p:bldLst>
   </p:timing>
 </p:sld>
@@ -29620,6 +29096,644 @@
           <p:cNvPr id="2" name="Title 1">
             <a:extLst>
               <a:ext uri="{FF2B5EF4-FFF2-40B4-BE49-F238E27FC236}">
+                <a16:creationId xmlns:a16="http://schemas.microsoft.com/office/drawing/2014/main" id="{55AC2C90-DDC5-486E-9507-4F3418F774CF}"/>
+              </a:ext>
+            </a:extLst>
+          </p:cNvPr>
+          <p:cNvSpPr>
+            <a:spLocks noGrp="1"/>
+          </p:cNvSpPr>
+          <p:nvPr>
+            <p:ph type="title"/>
+          </p:nvPr>
+        </p:nvSpPr>
+        <p:spPr/>
+        <p:txBody>
+          <a:bodyPr/>
+          <a:lstStyle/>
+          <a:p>
+            <a:r>
+              <a:rPr lang="en-US" dirty="0"/>
+              <a:t>Packages</a:t>
+            </a:r>
+          </a:p>
+        </p:txBody>
+      </p:sp>
+      <p:sp>
+        <p:nvSpPr>
+          <p:cNvPr id="3" name="Content Placeholder 2">
+            <a:extLst>
+              <a:ext uri="{FF2B5EF4-FFF2-40B4-BE49-F238E27FC236}">
+                <a16:creationId xmlns:a16="http://schemas.microsoft.com/office/drawing/2014/main" id="{B1198834-D6EA-4D93-B5A0-29171C47F1C7}"/>
+              </a:ext>
+            </a:extLst>
+          </p:cNvPr>
+          <p:cNvSpPr>
+            <a:spLocks noGrp="1"/>
+          </p:cNvSpPr>
+          <p:nvPr>
+            <p:ph idx="1"/>
+          </p:nvPr>
+        </p:nvSpPr>
+        <p:spPr/>
+        <p:txBody>
+          <a:bodyPr/>
+          <a:lstStyle/>
+          <a:p>
+            <a:r>
+              <a:rPr lang="en-US" dirty="0"/>
+              <a:t>Minimal package </a:t>
+            </a:r>
+            <a:r>
+              <a:rPr lang="en-US" dirty="0" err="1">
+                <a:latin typeface="Consolas" panose="020B0609020204030204" pitchFamily="49" charset="0"/>
+              </a:rPr>
+              <a:t>Gcd</a:t>
+            </a:r>
+            <a:endParaRPr lang="en-US" dirty="0">
+              <a:latin typeface="Consolas" panose="020B0609020204030204" pitchFamily="49" charset="0"/>
+            </a:endParaRPr>
+          </a:p>
+          <a:p>
+            <a:pPr lvl="1"/>
+            <a:endParaRPr lang="en-US" dirty="0"/>
+          </a:p>
+        </p:txBody>
+      </p:sp>
+      <p:sp>
+        <p:nvSpPr>
+          <p:cNvPr id="4" name="Slide Number Placeholder 3">
+            <a:extLst>
+              <a:ext uri="{FF2B5EF4-FFF2-40B4-BE49-F238E27FC236}">
+                <a16:creationId xmlns:a16="http://schemas.microsoft.com/office/drawing/2014/main" id="{76CD2ADE-9DFA-42E6-BC97-9CB864E0E6BF}"/>
+              </a:ext>
+            </a:extLst>
+          </p:cNvPr>
+          <p:cNvSpPr>
+            <a:spLocks noGrp="1"/>
+          </p:cNvSpPr>
+          <p:nvPr>
+            <p:ph type="sldNum" sz="quarter" idx="12"/>
+          </p:nvPr>
+        </p:nvSpPr>
+        <p:spPr/>
+        <p:txBody>
+          <a:bodyPr/>
+          <a:lstStyle/>
+          <a:p>
+            <a:fld id="{78F7A1EC-23D1-431D-8C93-9C4ED5D4A04D}" type="slidenum">
+              <a:rPr lang="en-US" smtClean="0"/>
+              <a:t>40</a:t>
+            </a:fld>
+            <a:endParaRPr lang="en-US"/>
+          </a:p>
+        </p:txBody>
+      </p:sp>
+      <p:grpSp>
+        <p:nvGrpSpPr>
+          <p:cNvPr id="7" name="Group 6">
+            <a:extLst>
+              <a:ext uri="{FF2B5EF4-FFF2-40B4-BE49-F238E27FC236}">
+                <a16:creationId xmlns:a16="http://schemas.microsoft.com/office/drawing/2014/main" id="{FABA1504-2F36-4CD8-B7C1-ABB5958246C4}"/>
+              </a:ext>
+            </a:extLst>
+          </p:cNvPr>
+          <p:cNvGrpSpPr/>
+          <p:nvPr/>
+        </p:nvGrpSpPr>
+        <p:grpSpPr>
+          <a:xfrm>
+            <a:off x="4624557" y="3536606"/>
+            <a:ext cx="7122600" cy="1200329"/>
+            <a:chOff x="838200" y="2455198"/>
+            <a:chExt cx="7122600" cy="1200329"/>
+          </a:xfrm>
+        </p:grpSpPr>
+        <p:sp>
+          <p:nvSpPr>
+            <p:cNvPr id="8" name="TextBox 7">
+              <a:extLst>
+                <a:ext uri="{FF2B5EF4-FFF2-40B4-BE49-F238E27FC236}">
+                  <a16:creationId xmlns:a16="http://schemas.microsoft.com/office/drawing/2014/main" id="{CA88DB7D-1186-4B6B-B509-84E8EFC9F006}"/>
+                </a:ext>
+              </a:extLst>
+            </p:cNvPr>
+            <p:cNvSpPr txBox="1"/>
+            <p:nvPr/>
+          </p:nvSpPr>
+          <p:spPr>
+            <a:xfrm>
+              <a:off x="838200" y="2455198"/>
+              <a:ext cx="7122600" cy="1200329"/>
+            </a:xfrm>
+            <a:prstGeom prst="rect">
+              <a:avLst/>
+            </a:prstGeom>
+            <a:solidFill>
+              <a:schemeClr val="bg1">
+                <a:lumMod val="85000"/>
+              </a:schemeClr>
+            </a:solidFill>
+          </p:spPr>
+          <p:txBody>
+            <a:bodyPr wrap="square" rtlCol="0">
+              <a:spAutoFit/>
+            </a:bodyPr>
+            <a:lstStyle/>
+            <a:p>
+              <a:r>
+                <a:rPr lang="en-US" dirty="0">
+                  <a:latin typeface="Consolas" panose="020B0609020204030204" pitchFamily="49" charset="0"/>
+                </a:rPr>
+                <a:t>name = "</a:t>
+              </a:r>
+              <a:r>
+                <a:rPr lang="en-US" dirty="0" err="1">
+                  <a:latin typeface="Consolas" panose="020B0609020204030204" pitchFamily="49" charset="0"/>
+                </a:rPr>
+                <a:t>Gcd</a:t>
+              </a:r>
+              <a:r>
+                <a:rPr lang="en-US" dirty="0">
+                  <a:latin typeface="Consolas" panose="020B0609020204030204" pitchFamily="49" charset="0"/>
+                </a:rPr>
+                <a:t>"</a:t>
+              </a:r>
+            </a:p>
+            <a:p>
+              <a:r>
+                <a:rPr lang="en-US" dirty="0" err="1">
+                  <a:latin typeface="Consolas" panose="020B0609020204030204" pitchFamily="49" charset="0"/>
+                </a:rPr>
+                <a:t>uuid</a:t>
+              </a:r>
+              <a:r>
+                <a:rPr lang="en-US" dirty="0">
+                  <a:latin typeface="Consolas" panose="020B0609020204030204" pitchFamily="49" charset="0"/>
+                </a:rPr>
+                <a:t> = "6101a580-870c-4971-a759-bb25a2f00590"</a:t>
+              </a:r>
+            </a:p>
+            <a:p>
+              <a:r>
+                <a:rPr lang="en-US" dirty="0">
+                  <a:latin typeface="Consolas" panose="020B0609020204030204" pitchFamily="49" charset="0"/>
+                </a:rPr>
+                <a:t>authors = ["Geert Jan Bex &lt;geertjan.bex@uhasselt.be&gt;"]</a:t>
+              </a:r>
+            </a:p>
+            <a:p>
+              <a:r>
+                <a:rPr lang="en-US" dirty="0">
+                  <a:latin typeface="Consolas" panose="020B0609020204030204" pitchFamily="49" charset="0"/>
+                </a:rPr>
+                <a:t>version = "0.1.0"</a:t>
+              </a:r>
+            </a:p>
+          </p:txBody>
+        </p:sp>
+        <p:sp>
+          <p:nvSpPr>
+            <p:cNvPr id="9" name="TextBox 8">
+              <a:extLst>
+                <a:ext uri="{FF2B5EF4-FFF2-40B4-BE49-F238E27FC236}">
+                  <a16:creationId xmlns:a16="http://schemas.microsoft.com/office/drawing/2014/main" id="{EDE038DF-3332-4C06-ADCC-AB3BFD0EC7E4}"/>
+                </a:ext>
+              </a:extLst>
+            </p:cNvPr>
+            <p:cNvSpPr txBox="1"/>
+            <p:nvPr/>
+          </p:nvSpPr>
+          <p:spPr>
+            <a:xfrm>
+              <a:off x="7057064" y="3384864"/>
+              <a:ext cx="889987" cy="261610"/>
+            </a:xfrm>
+            <a:prstGeom prst="rect">
+              <a:avLst/>
+            </a:prstGeom>
+            <a:solidFill>
+              <a:schemeClr val="bg1"/>
+            </a:solidFill>
+            <a:ln>
+              <a:solidFill>
+                <a:schemeClr val="tx1"/>
+              </a:solidFill>
+            </a:ln>
+          </p:spPr>
+          <p:txBody>
+            <a:bodyPr wrap="none" rtlCol="0">
+              <a:spAutoFit/>
+            </a:bodyPr>
+            <a:lstStyle/>
+            <a:p>
+              <a:r>
+                <a:rPr lang="en-US" sz="1100" dirty="0" err="1"/>
+                <a:t>Project.tmol</a:t>
+              </a:r>
+              <a:endParaRPr lang="en-US" sz="1100" dirty="0"/>
+            </a:p>
+          </p:txBody>
+        </p:sp>
+      </p:grpSp>
+      <p:sp>
+        <p:nvSpPr>
+          <p:cNvPr id="10" name="TextBox 9">
+            <a:extLst>
+              <a:ext uri="{FF2B5EF4-FFF2-40B4-BE49-F238E27FC236}">
+                <a16:creationId xmlns:a16="http://schemas.microsoft.com/office/drawing/2014/main" id="{93D8DF2F-DAD4-45C9-BE67-1101395542A5}"/>
+              </a:ext>
+            </a:extLst>
+          </p:cNvPr>
+          <p:cNvSpPr txBox="1"/>
+          <p:nvPr/>
+        </p:nvSpPr>
+        <p:spPr>
+          <a:xfrm>
+            <a:off x="1492463" y="2496450"/>
+            <a:ext cx="2305172" cy="369332"/>
+          </a:xfrm>
+          <a:prstGeom prst="rect">
+            <a:avLst/>
+          </a:prstGeom>
+          <a:solidFill>
+            <a:schemeClr val="tx1"/>
+          </a:solidFill>
+        </p:spPr>
+        <p:txBody>
+          <a:bodyPr wrap="square" rtlCol="0">
+            <a:spAutoFit/>
+          </a:bodyPr>
+          <a:lstStyle/>
+          <a:p>
+            <a:r>
+              <a:rPr lang="en-US" b="1" dirty="0">
+                <a:solidFill>
+                  <a:schemeClr val="bg1"/>
+                </a:solidFill>
+              </a:rPr>
+              <a:t>pkg&gt; generate </a:t>
+            </a:r>
+            <a:r>
+              <a:rPr lang="en-US" b="1" dirty="0" err="1">
+                <a:solidFill>
+                  <a:schemeClr val="bg1"/>
+                </a:solidFill>
+              </a:rPr>
+              <a:t>Gcd</a:t>
+            </a:r>
+            <a:endParaRPr lang="en-US" b="1" dirty="0">
+              <a:solidFill>
+                <a:schemeClr val="bg1"/>
+              </a:solidFill>
+            </a:endParaRPr>
+          </a:p>
+        </p:txBody>
+      </p:sp>
+      <p:grpSp>
+        <p:nvGrpSpPr>
+          <p:cNvPr id="5" name="Group 4">
+            <a:extLst>
+              <a:ext uri="{FF2B5EF4-FFF2-40B4-BE49-F238E27FC236}">
+                <a16:creationId xmlns:a16="http://schemas.microsoft.com/office/drawing/2014/main" id="{81092623-75C1-4D86-9324-75CCF3BFFAA3}"/>
+              </a:ext>
+            </a:extLst>
+          </p:cNvPr>
+          <p:cNvGrpSpPr/>
+          <p:nvPr/>
+        </p:nvGrpSpPr>
+        <p:grpSpPr>
+          <a:xfrm>
+            <a:off x="1492464" y="2981413"/>
+            <a:ext cx="2305176" cy="1763423"/>
+            <a:chOff x="1492464" y="2981413"/>
+            <a:chExt cx="2305176" cy="1763423"/>
+          </a:xfrm>
+        </p:grpSpPr>
+        <p:pic>
+          <p:nvPicPr>
+            <p:cNvPr id="6" name="Picture 5">
+              <a:extLst>
+                <a:ext uri="{FF2B5EF4-FFF2-40B4-BE49-F238E27FC236}">
+                  <a16:creationId xmlns:a16="http://schemas.microsoft.com/office/drawing/2014/main" id="{81586ECD-7D08-460B-959E-FA6E06707932}"/>
+                </a:ext>
+              </a:extLst>
+            </p:cNvPr>
+            <p:cNvPicPr>
+              <a:picLocks noChangeAspect="1"/>
+            </p:cNvPicPr>
+            <p:nvPr/>
+          </p:nvPicPr>
+          <p:blipFill>
+            <a:blip r:embed="rId2"/>
+            <a:stretch>
+              <a:fillRect/>
+            </a:stretch>
+          </p:blipFill>
+          <p:spPr>
+            <a:xfrm>
+              <a:off x="1492464" y="3536606"/>
+              <a:ext cx="2305176" cy="1208230"/>
+            </a:xfrm>
+            <a:prstGeom prst="rect">
+              <a:avLst/>
+            </a:prstGeom>
+          </p:spPr>
+        </p:pic>
+        <p:cxnSp>
+          <p:nvCxnSpPr>
+            <p:cNvPr id="11" name="Straight Arrow Connector 10">
+              <a:extLst>
+                <a:ext uri="{FF2B5EF4-FFF2-40B4-BE49-F238E27FC236}">
+                  <a16:creationId xmlns:a16="http://schemas.microsoft.com/office/drawing/2014/main" id="{54D693ED-BB43-4463-A5C9-FC7AD066AF1A}"/>
+                </a:ext>
+              </a:extLst>
+            </p:cNvPr>
+            <p:cNvCxnSpPr>
+              <a:cxnSpLocks/>
+            </p:cNvCxnSpPr>
+            <p:nvPr/>
+          </p:nvCxnSpPr>
+          <p:spPr>
+            <a:xfrm rot="5400000">
+              <a:off x="2569856" y="3179122"/>
+              <a:ext cx="395417" cy="0"/>
+            </a:xfrm>
+            <a:prstGeom prst="straightConnector1">
+              <a:avLst/>
+            </a:prstGeom>
+            <a:ln w="38100">
+              <a:solidFill>
+                <a:schemeClr val="tx1"/>
+              </a:solidFill>
+              <a:tailEnd type="stealth" w="lg" len="lg"/>
+            </a:ln>
+          </p:spPr>
+          <p:style>
+            <a:lnRef idx="1">
+              <a:schemeClr val="accent1"/>
+            </a:lnRef>
+            <a:fillRef idx="0">
+              <a:schemeClr val="accent1"/>
+            </a:fillRef>
+            <a:effectRef idx="0">
+              <a:schemeClr val="accent1"/>
+            </a:effectRef>
+            <a:fontRef idx="minor">
+              <a:schemeClr val="tx1"/>
+            </a:fontRef>
+          </p:style>
+        </p:cxnSp>
+      </p:grpSp>
+      <p:sp>
+        <p:nvSpPr>
+          <p:cNvPr id="12" name="TextBox 11">
+            <a:extLst>
+              <a:ext uri="{FF2B5EF4-FFF2-40B4-BE49-F238E27FC236}">
+                <a16:creationId xmlns:a16="http://schemas.microsoft.com/office/drawing/2014/main" id="{FF705B03-BE6A-4F88-A45C-E7D83A8B84D0}"/>
+              </a:ext>
+            </a:extLst>
+          </p:cNvPr>
+          <p:cNvSpPr txBox="1"/>
+          <p:nvPr/>
+        </p:nvSpPr>
+        <p:spPr>
+          <a:xfrm>
+            <a:off x="3534032" y="5410782"/>
+            <a:ext cx="7266092" cy="461665"/>
+          </a:xfrm>
+          <a:prstGeom prst="rect">
+            <a:avLst/>
+          </a:prstGeom>
+          <a:noFill/>
+          <a:ln>
+            <a:solidFill>
+              <a:schemeClr val="tx1"/>
+            </a:solidFill>
+          </a:ln>
+        </p:spPr>
+        <p:txBody>
+          <a:bodyPr wrap="none" rtlCol="0">
+            <a:spAutoFit/>
+          </a:bodyPr>
+          <a:lstStyle/>
+          <a:p>
+            <a:r>
+              <a:rPr lang="en-US" sz="2400" dirty="0"/>
+              <a:t>Ensure project parent directory is in </a:t>
+            </a:r>
+            <a:r>
+              <a:rPr lang="en-US" sz="2400" dirty="0">
+                <a:latin typeface="Consolas" panose="020B0609020204030204" pitchFamily="49" charset="0"/>
+              </a:rPr>
+              <a:t>JULIA_LOAD_PATH</a:t>
+            </a:r>
+          </a:p>
+        </p:txBody>
+      </p:sp>
+    </p:spTree>
+    <p:extLst>
+      <p:ext uri="{BB962C8B-B14F-4D97-AF65-F5344CB8AC3E}">
+        <p14:creationId xmlns:p14="http://schemas.microsoft.com/office/powerpoint/2010/main" val="243560851"/>
+      </p:ext>
+    </p:extLst>
+  </p:cSld>
+  <p:clrMapOvr>
+    <a:masterClrMapping/>
+  </p:clrMapOvr>
+  <p:timing>
+    <p:tnLst>
+      <p:par>
+        <p:cTn id="1" dur="indefinite" restart="never" nodeType="tmRoot">
+          <p:childTnLst>
+            <p:seq concurrent="1" nextAc="seek">
+              <p:cTn id="2" dur="indefinite" nodeType="mainSeq">
+                <p:childTnLst>
+                  <p:par>
+                    <p:cTn id="3" fill="hold">
+                      <p:stCondLst>
+                        <p:cond delay="indefinite"/>
+                      </p:stCondLst>
+                      <p:childTnLst>
+                        <p:par>
+                          <p:cTn id="4" fill="hold">
+                            <p:stCondLst>
+                              <p:cond delay="0"/>
+                            </p:stCondLst>
+                            <p:childTnLst>
+                              <p:par>
+                                <p:cTn id="5" presetID="1" presetClass="entr" presetSubtype="0" fill="hold" nodeType="clickEffect">
+                                  <p:stCondLst>
+                                    <p:cond delay="0"/>
+                                  </p:stCondLst>
+                                  <p:childTnLst>
+                                    <p:set>
+                                      <p:cBhvr>
+                                        <p:cTn id="6" dur="1" fill="hold">
+                                          <p:stCondLst>
+                                            <p:cond delay="0"/>
+                                          </p:stCondLst>
+                                        </p:cTn>
+                                        <p:tgtEl>
+                                          <p:spTgt spid="5"/>
+                                        </p:tgtEl>
+                                        <p:attrNameLst>
+                                          <p:attrName>style.visibility</p:attrName>
+                                        </p:attrNameLst>
+                                      </p:cBhvr>
+                                      <p:to>
+                                        <p:strVal val="visible"/>
+                                      </p:to>
+                                    </p:set>
+                                  </p:childTnLst>
+                                </p:cTn>
+                              </p:par>
+                            </p:childTnLst>
+                          </p:cTn>
+                        </p:par>
+                      </p:childTnLst>
+                    </p:cTn>
+                  </p:par>
+                  <p:par>
+                    <p:cTn id="7" fill="hold">
+                      <p:stCondLst>
+                        <p:cond delay="indefinite"/>
+                      </p:stCondLst>
+                      <p:childTnLst>
+                        <p:par>
+                          <p:cTn id="8" fill="hold">
+                            <p:stCondLst>
+                              <p:cond delay="0"/>
+                            </p:stCondLst>
+                            <p:childTnLst>
+                              <p:par>
+                                <p:cTn id="9" presetID="1" presetClass="entr" presetSubtype="0" fill="hold" nodeType="clickEffect">
+                                  <p:stCondLst>
+                                    <p:cond delay="0"/>
+                                  </p:stCondLst>
+                                  <p:childTnLst>
+                                    <p:set>
+                                      <p:cBhvr>
+                                        <p:cTn id="10" dur="1" fill="hold">
+                                          <p:stCondLst>
+                                            <p:cond delay="0"/>
+                                          </p:stCondLst>
+                                        </p:cTn>
+                                        <p:tgtEl>
+                                          <p:spTgt spid="7"/>
+                                        </p:tgtEl>
+                                        <p:attrNameLst>
+                                          <p:attrName>style.visibility</p:attrName>
+                                        </p:attrNameLst>
+                                      </p:cBhvr>
+                                      <p:to>
+                                        <p:strVal val="visible"/>
+                                      </p:to>
+                                    </p:set>
+                                  </p:childTnLst>
+                                </p:cTn>
+                              </p:par>
+                            </p:childTnLst>
+                          </p:cTn>
+                        </p:par>
+                      </p:childTnLst>
+                    </p:cTn>
+                  </p:par>
+                  <p:par>
+                    <p:cTn id="11" fill="hold">
+                      <p:stCondLst>
+                        <p:cond delay="indefinite"/>
+                      </p:stCondLst>
+                      <p:childTnLst>
+                        <p:par>
+                          <p:cTn id="12" fill="hold">
+                            <p:stCondLst>
+                              <p:cond delay="0"/>
+                            </p:stCondLst>
+                            <p:childTnLst>
+                              <p:par>
+                                <p:cTn id="13" presetID="1" presetClass="entr" presetSubtype="0" fill="hold" grpId="0" nodeType="clickEffect">
+                                  <p:stCondLst>
+                                    <p:cond delay="0"/>
+                                  </p:stCondLst>
+                                  <p:childTnLst>
+                                    <p:set>
+                                      <p:cBhvr>
+                                        <p:cTn id="14" dur="1" fill="hold">
+                                          <p:stCondLst>
+                                            <p:cond delay="0"/>
+                                          </p:stCondLst>
+                                        </p:cTn>
+                                        <p:tgtEl>
+                                          <p:spTgt spid="12"/>
+                                        </p:tgtEl>
+                                        <p:attrNameLst>
+                                          <p:attrName>style.visibility</p:attrName>
+                                        </p:attrNameLst>
+                                      </p:cBhvr>
+                                      <p:to>
+                                        <p:strVal val="visible"/>
+                                      </p:to>
+                                    </p:set>
+                                  </p:childTnLst>
+                                </p:cTn>
+                              </p:par>
+                            </p:childTnLst>
+                          </p:cTn>
+                        </p:par>
+                      </p:childTnLst>
+                    </p:cTn>
+                  </p:par>
+                </p:childTnLst>
+              </p:cTn>
+              <p:prevCondLst>
+                <p:cond evt="onPrev" delay="0">
+                  <p:tgtEl>
+                    <p:sldTgt/>
+                  </p:tgtEl>
+                </p:cond>
+              </p:prevCondLst>
+              <p:nextCondLst>
+                <p:cond evt="onNext" delay="0">
+                  <p:tgtEl>
+                    <p:sldTgt/>
+                  </p:tgtEl>
+                </p:cond>
+              </p:nextCondLst>
+            </p:seq>
+          </p:childTnLst>
+        </p:cTn>
+      </p:par>
+    </p:tnLst>
+    <p:bldLst>
+      <p:bldP spid="12" grpId="0" animBg="1"/>
+    </p:bldLst>
+  </p:timing>
+</p:sld>
+</file>
+
+<file path=ppt/slides/slide41.xml><?xml version="1.0" encoding="utf-8"?>
+<p:sld xmlns:a="http://schemas.openxmlformats.org/drawingml/2006/main" xmlns:r="http://schemas.openxmlformats.org/officeDocument/2006/relationships" xmlns:p="http://schemas.openxmlformats.org/presentationml/2006/main">
+  <p:cSld>
+    <p:spTree>
+      <p:nvGrpSpPr>
+        <p:cNvPr id="1" name=""/>
+        <p:cNvGrpSpPr/>
+        <p:nvPr/>
+      </p:nvGrpSpPr>
+      <p:grpSpPr>
+        <a:xfrm>
+          <a:off x="0" y="0"/>
+          <a:ext cx="0" cy="0"/>
+          <a:chOff x="0" y="0"/>
+          <a:chExt cx="0" cy="0"/>
+        </a:xfrm>
+      </p:grpSpPr>
+      <p:sp>
+        <p:nvSpPr>
+          <p:cNvPr id="2" name="Title 1">
+            <a:extLst>
+              <a:ext uri="{FF2B5EF4-FFF2-40B4-BE49-F238E27FC236}">
                 <a16:creationId xmlns:a16="http://schemas.microsoft.com/office/drawing/2014/main" id="{F78F35D8-8A5F-4433-97B9-58052C5D5AF5}"/>
               </a:ext>
             </a:extLst>
@@ -29694,7 +29808,7 @@
           <a:p>
             <a:fld id="{78F7A1EC-23D1-431D-8C93-9C4ED5D4A04D}" type="slidenum">
               <a:rPr lang="en-US" smtClean="0"/>
-              <a:t>40</a:t>
+              <a:t>41</a:t>
             </a:fld>
             <a:endParaRPr lang="en-US"/>
           </a:p>
@@ -30107,7 +30221,7 @@
 </p:sld>
 </file>
 
-<file path=ppt/slides/slide41.xml><?xml version="1.0" encoding="utf-8"?>
+<file path=ppt/slides/slide42.xml><?xml version="1.0" encoding="utf-8"?>
 <p:sld xmlns:a="http://schemas.openxmlformats.org/drawingml/2006/main" xmlns:r="http://schemas.openxmlformats.org/officeDocument/2006/relationships" xmlns:p="http://schemas.openxmlformats.org/presentationml/2006/main">
   <p:cSld>
     <p:spTree>
@@ -30200,7 +30314,7 @@
           <a:p>
             <a:fld id="{78F7A1EC-23D1-431D-8C93-9C4ED5D4A04D}" type="slidenum">
               <a:rPr lang="en-US" smtClean="0"/>
-              <a:t>41</a:t>
+              <a:t>42</a:t>
             </a:fld>
             <a:endParaRPr lang="en-US"/>
           </a:p>
@@ -30219,7 +30333,7 @@
 </p:sld>
 </file>
 
-<file path=ppt/slides/slide42.xml><?xml version="1.0" encoding="utf-8"?>
+<file path=ppt/slides/slide43.xml><?xml version="1.0" encoding="utf-8"?>
 <p:sld xmlns:a="http://schemas.openxmlformats.org/drawingml/2006/main" xmlns:r="http://schemas.openxmlformats.org/officeDocument/2006/relationships" xmlns:p="http://schemas.openxmlformats.org/presentationml/2006/main">
   <p:cSld>
     <p:spTree>
@@ -30343,7 +30457,7 @@
           <a:p>
             <a:fld id="{78F7A1EC-23D1-431D-8C93-9C4ED5D4A04D}" type="slidenum">
               <a:rPr lang="en-US" smtClean="0"/>
-              <a:t>42</a:t>
+              <a:t>43</a:t>
             </a:fld>
             <a:endParaRPr lang="en-US"/>
           </a:p>
@@ -30594,7 +30708,7 @@
 </p:sld>
 </file>
 
-<file path=ppt/slides/slide43.xml><?xml version="1.0" encoding="utf-8"?>
+<file path=ppt/slides/slide44.xml><?xml version="1.0" encoding="utf-8"?>
 <p:sld xmlns:a="http://schemas.openxmlformats.org/drawingml/2006/main" xmlns:r="http://schemas.openxmlformats.org/officeDocument/2006/relationships" xmlns:p="http://schemas.openxmlformats.org/presentationml/2006/main">
   <p:cSld>
     <p:spTree>
@@ -30753,7 +30867,7 @@
           <a:p>
             <a:fld id="{78F7A1EC-23D1-431D-8C93-9C4ED5D4A04D}" type="slidenum">
               <a:rPr lang="en-US" smtClean="0"/>
-              <a:t>43</a:t>
+              <a:t>44</a:t>
             </a:fld>
             <a:endParaRPr lang="en-US"/>
           </a:p>
@@ -31053,7 +31167,7 @@
 </p:sld>
 </file>
 
-<file path=ppt/slides/slide44.xml><?xml version="1.0" encoding="utf-8"?>
+<file path=ppt/slides/slide45.xml><?xml version="1.0" encoding="utf-8"?>
 <p:sld xmlns:a="http://schemas.openxmlformats.org/drawingml/2006/main" xmlns:r="http://schemas.openxmlformats.org/officeDocument/2006/relationships" xmlns:p="http://schemas.openxmlformats.org/presentationml/2006/main">
   <p:cSld>
     <p:spTree>
@@ -31146,7 +31260,7 @@
           <a:p>
             <a:fld id="{78F7A1EC-23D1-431D-8C93-9C4ED5D4A04D}" type="slidenum">
               <a:rPr lang="en-US" smtClean="0"/>
-              <a:t>44</a:t>
+              <a:t>45</a:t>
             </a:fld>
             <a:endParaRPr lang="en-US"/>
           </a:p>
@@ -31165,7 +31279,7 @@
 </p:sld>
 </file>
 
-<file path=ppt/slides/slide45.xml><?xml version="1.0" encoding="utf-8"?>
+<file path=ppt/slides/slide46.xml><?xml version="1.0" encoding="utf-8"?>
 <p:sld xmlns:a="http://schemas.openxmlformats.org/drawingml/2006/main" xmlns:r="http://schemas.openxmlformats.org/officeDocument/2006/relationships" xmlns:p="http://schemas.openxmlformats.org/presentationml/2006/main">
   <p:cSld>
     <p:spTree>
@@ -31273,7 +31387,7 @@
           <a:p>
             <a:fld id="{78F7A1EC-23D1-431D-8C93-9C4ED5D4A04D}" type="slidenum">
               <a:rPr lang="en-US" smtClean="0"/>
-              <a:t>45</a:t>
+              <a:t>46</a:t>
             </a:fld>
             <a:endParaRPr lang="en-US"/>
           </a:p>
@@ -31558,7 +31672,7 @@
 </p:sld>
 </file>
 
-<file path=ppt/slides/slide46.xml><?xml version="1.0" encoding="utf-8"?>
+<file path=ppt/slides/slide47.xml><?xml version="1.0" encoding="utf-8"?>
 <p:sld xmlns:a="http://schemas.openxmlformats.org/drawingml/2006/main" xmlns:r="http://schemas.openxmlformats.org/officeDocument/2006/relationships" xmlns:p="http://schemas.openxmlformats.org/presentationml/2006/main">
   <p:cSld>
     <p:spTree>
@@ -31693,7 +31807,7 @@
           <a:p>
             <a:fld id="{78F7A1EC-23D1-431D-8C93-9C4ED5D4A04D}" type="slidenum">
               <a:rPr lang="en-US" smtClean="0"/>
-              <a:t>46</a:t>
+              <a:t>47</a:t>
             </a:fld>
             <a:endParaRPr lang="en-US"/>
           </a:p>
@@ -31712,7 +31826,7 @@
 </p:sld>
 </file>
 
-<file path=ppt/slides/slide47.xml><?xml version="1.0" encoding="utf-8"?>
+<file path=ppt/slides/slide48.xml><?xml version="1.0" encoding="utf-8"?>
 <p:sld xmlns:a="http://schemas.openxmlformats.org/drawingml/2006/main" xmlns:r="http://schemas.openxmlformats.org/officeDocument/2006/relationships" xmlns:p="http://schemas.openxmlformats.org/presentationml/2006/main">
   <p:cSld>
     <p:spTree>
@@ -31831,7 +31945,7 @@
           <a:p>
             <a:fld id="{78F7A1EC-23D1-431D-8C93-9C4ED5D4A04D}" type="slidenum">
               <a:rPr lang="en-US" smtClean="0"/>
-              <a:t>47</a:t>
+              <a:t>48</a:t>
             </a:fld>
             <a:endParaRPr lang="en-US"/>
           </a:p>
@@ -32461,6 +32575,803 @@
           <p:cNvPr id="2" name="Title 1">
             <a:extLst>
               <a:ext uri="{FF2B5EF4-FFF2-40B4-BE49-F238E27FC236}">
+                <a16:creationId xmlns:a16="http://schemas.microsoft.com/office/drawing/2014/main" id="{E036CB61-AF0E-6263-C537-4A200729FA28}"/>
+              </a:ext>
+            </a:extLst>
+          </p:cNvPr>
+          <p:cNvSpPr>
+            <a:spLocks noGrp="1"/>
+          </p:cNvSpPr>
+          <p:nvPr>
+            <p:ph type="title"/>
+          </p:nvPr>
+        </p:nvSpPr>
+        <p:spPr/>
+        <p:txBody>
+          <a:bodyPr/>
+          <a:lstStyle/>
+          <a:p>
+            <a:r>
+              <a:rPr lang="en-US" dirty="0"/>
+              <a:t>How to run Julia?</a:t>
+            </a:r>
+          </a:p>
+        </p:txBody>
+      </p:sp>
+      <p:sp>
+        <p:nvSpPr>
+          <p:cNvPr id="3" name="Content Placeholder 2">
+            <a:extLst>
+              <a:ext uri="{FF2B5EF4-FFF2-40B4-BE49-F238E27FC236}">
+                <a16:creationId xmlns:a16="http://schemas.microsoft.com/office/drawing/2014/main" id="{3C9F5873-41B6-02FB-F426-FEE506E75FA9}"/>
+              </a:ext>
+            </a:extLst>
+          </p:cNvPr>
+          <p:cNvSpPr>
+            <a:spLocks noGrp="1"/>
+          </p:cNvSpPr>
+          <p:nvPr>
+            <p:ph sz="half" idx="1"/>
+          </p:nvPr>
+        </p:nvSpPr>
+        <p:spPr/>
+        <p:txBody>
+          <a:bodyPr>
+            <a:normAutofit/>
+          </a:bodyPr>
+          <a:lstStyle/>
+          <a:p>
+            <a:r>
+              <a:rPr lang="en-US" dirty="0"/>
+              <a:t>Interactive in shell</a:t>
+            </a:r>
+          </a:p>
+          <a:p>
+            <a:endParaRPr lang="en-US" dirty="0"/>
+          </a:p>
+          <a:p>
+            <a:endParaRPr lang="en-US" dirty="0"/>
+          </a:p>
+          <a:p>
+            <a:endParaRPr lang="en-US" dirty="0"/>
+          </a:p>
+          <a:p>
+            <a:endParaRPr lang="en-US" dirty="0"/>
+          </a:p>
+          <a:p>
+            <a:endParaRPr lang="en-US" dirty="0"/>
+          </a:p>
+          <a:p>
+            <a:r>
+              <a:rPr lang="en-US" dirty="0"/>
+              <a:t>Notebook</a:t>
+            </a:r>
+          </a:p>
+        </p:txBody>
+      </p:sp>
+      <p:sp>
+        <p:nvSpPr>
+          <p:cNvPr id="8" name="Content Placeholder 7">
+            <a:extLst>
+              <a:ext uri="{FF2B5EF4-FFF2-40B4-BE49-F238E27FC236}">
+                <a16:creationId xmlns:a16="http://schemas.microsoft.com/office/drawing/2014/main" id="{1C387365-8F7A-09A5-CC7E-64E883AB5A6F}"/>
+              </a:ext>
+            </a:extLst>
+          </p:cNvPr>
+          <p:cNvSpPr>
+            <a:spLocks noGrp="1"/>
+          </p:cNvSpPr>
+          <p:nvPr>
+            <p:ph sz="half" idx="2"/>
+          </p:nvPr>
+        </p:nvSpPr>
+        <p:spPr/>
+        <p:txBody>
+          <a:bodyPr/>
+          <a:lstStyle/>
+          <a:p>
+            <a:r>
+              <a:rPr lang="en-US" dirty="0"/>
+              <a:t>Run script</a:t>
+            </a:r>
+          </a:p>
+        </p:txBody>
+      </p:sp>
+      <p:sp>
+        <p:nvSpPr>
+          <p:cNvPr id="4" name="Slide Number Placeholder 3">
+            <a:extLst>
+              <a:ext uri="{FF2B5EF4-FFF2-40B4-BE49-F238E27FC236}">
+                <a16:creationId xmlns:a16="http://schemas.microsoft.com/office/drawing/2014/main" id="{8A1E7384-1781-94DD-68AA-4D229A3C0BC3}"/>
+              </a:ext>
+            </a:extLst>
+          </p:cNvPr>
+          <p:cNvSpPr>
+            <a:spLocks noGrp="1"/>
+          </p:cNvSpPr>
+          <p:nvPr>
+            <p:ph type="sldNum" sz="quarter" idx="12"/>
+          </p:nvPr>
+        </p:nvSpPr>
+        <p:spPr/>
+        <p:txBody>
+          <a:bodyPr/>
+          <a:lstStyle/>
+          <a:p>
+            <a:fld id="{78F7A1EC-23D1-431D-8C93-9C4ED5D4A04D}" type="slidenum">
+              <a:rPr lang="en-US" smtClean="0"/>
+              <a:t>6</a:t>
+            </a:fld>
+            <a:endParaRPr lang="en-US"/>
+          </a:p>
+        </p:txBody>
+      </p:sp>
+      <p:sp>
+        <p:nvSpPr>
+          <p:cNvPr id="5" name="TextBox 4">
+            <a:extLst>
+              <a:ext uri="{FF2B5EF4-FFF2-40B4-BE49-F238E27FC236}">
+                <a16:creationId xmlns:a16="http://schemas.microsoft.com/office/drawing/2014/main" id="{F9D6616B-02C3-EBDB-A236-B15CC6082796}"/>
+              </a:ext>
+            </a:extLst>
+          </p:cNvPr>
+          <p:cNvSpPr txBox="1"/>
+          <p:nvPr/>
+        </p:nvSpPr>
+        <p:spPr>
+          <a:xfrm>
+            <a:off x="596930" y="2308404"/>
+            <a:ext cx="4823888" cy="2462213"/>
+          </a:xfrm>
+          <a:prstGeom prst="rect">
+            <a:avLst/>
+          </a:prstGeom>
+          <a:solidFill>
+            <a:schemeClr val="tx1"/>
+          </a:solidFill>
+        </p:spPr>
+        <p:txBody>
+          <a:bodyPr wrap="square" rtlCol="0">
+            <a:spAutoFit/>
+          </a:bodyPr>
+          <a:lstStyle/>
+          <a:p>
+            <a:r>
+              <a:rPr lang="en-US" sz="1400" b="1" dirty="0">
+                <a:solidFill>
+                  <a:schemeClr val="bg1"/>
+                </a:solidFill>
+              </a:rPr>
+              <a:t>$ </a:t>
+            </a:r>
+            <a:r>
+              <a:rPr lang="en-US" sz="1400" b="1" dirty="0" err="1">
+                <a:solidFill>
+                  <a:schemeClr val="bg1"/>
+                </a:solidFill>
+              </a:rPr>
+              <a:t>julia</a:t>
+            </a:r>
+            <a:endParaRPr lang="en-US" sz="1400" b="1" dirty="0">
+              <a:solidFill>
+                <a:schemeClr val="bg1"/>
+              </a:solidFill>
+            </a:endParaRPr>
+          </a:p>
+          <a:p>
+            <a:r>
+              <a:rPr lang="en-US" sz="1400" b="1" dirty="0">
+                <a:solidFill>
+                  <a:schemeClr val="bg1"/>
+                </a:solidFill>
+              </a:rPr>
+              <a:t>               _</a:t>
+            </a:r>
+          </a:p>
+          <a:p>
+            <a:r>
+              <a:rPr lang="en-US" sz="1400" b="1" dirty="0">
+                <a:solidFill>
+                  <a:schemeClr val="bg1"/>
+                </a:solidFill>
+              </a:rPr>
+              <a:t>   _       _ _(_)_     |  Documentation: https://docs.julialang.org</a:t>
+            </a:r>
+          </a:p>
+          <a:p>
+            <a:r>
+              <a:rPr lang="en-US" sz="1400" b="1" dirty="0">
+                <a:solidFill>
+                  <a:schemeClr val="bg1"/>
+                </a:solidFill>
+              </a:rPr>
+              <a:t>  (_)     | (_) (_)    |</a:t>
+            </a:r>
+          </a:p>
+          <a:p>
+            <a:r>
+              <a:rPr lang="en-US" sz="1400" b="1" dirty="0">
+                <a:solidFill>
+                  <a:schemeClr val="bg1"/>
+                </a:solidFill>
+              </a:rPr>
+              <a:t>   _ _   _| |_  __ _   |  Type "?" for help, "]?" for Pkg help.</a:t>
+            </a:r>
+          </a:p>
+          <a:p>
+            <a:r>
+              <a:rPr lang="en-US" sz="1400" b="1" dirty="0">
+                <a:solidFill>
+                  <a:schemeClr val="bg1"/>
+                </a:solidFill>
+              </a:rPr>
+              <a:t>  | | | | | | |/ _` |  |</a:t>
+            </a:r>
+          </a:p>
+          <a:p>
+            <a:r>
+              <a:rPr lang="en-US" sz="1400" b="1" dirty="0">
+                <a:solidFill>
+                  <a:schemeClr val="bg1"/>
+                </a:solidFill>
+              </a:rPr>
+              <a:t>  | | |_| | | | (_| |  |  Version 1.8.5 (2023-01-08)</a:t>
+            </a:r>
+          </a:p>
+          <a:p>
+            <a:r>
+              <a:rPr lang="en-US" sz="1400" b="1" dirty="0">
+                <a:solidFill>
+                  <a:schemeClr val="bg1"/>
+                </a:solidFill>
+              </a:rPr>
+              <a:t> _/ |\__'_|_|_|\__'_|  |  Official https://julialang.org/ release</a:t>
+            </a:r>
+          </a:p>
+          <a:p>
+            <a:r>
+              <a:rPr lang="en-US" sz="1400" b="1" dirty="0">
+                <a:solidFill>
+                  <a:schemeClr val="bg1"/>
+                </a:solidFill>
+              </a:rPr>
+              <a:t>|__/                   |</a:t>
+            </a:r>
+          </a:p>
+          <a:p>
+            <a:endParaRPr lang="en-US" sz="1400" b="1" dirty="0">
+              <a:solidFill>
+                <a:schemeClr val="bg1"/>
+              </a:solidFill>
+            </a:endParaRPr>
+          </a:p>
+          <a:p>
+            <a:r>
+              <a:rPr lang="en-US" sz="1400" b="1" dirty="0" err="1">
+                <a:solidFill>
+                  <a:schemeClr val="bg1"/>
+                </a:solidFill>
+              </a:rPr>
+              <a:t>julia</a:t>
+            </a:r>
+            <a:r>
+              <a:rPr lang="en-US" sz="1400" b="1" dirty="0">
+                <a:solidFill>
+                  <a:schemeClr val="bg1"/>
+                </a:solidFill>
+              </a:rPr>
+              <a:t>&gt;</a:t>
+            </a:r>
+          </a:p>
+        </p:txBody>
+      </p:sp>
+      <p:sp>
+        <p:nvSpPr>
+          <p:cNvPr id="6" name="TextBox 5">
+            <a:extLst>
+              <a:ext uri="{FF2B5EF4-FFF2-40B4-BE49-F238E27FC236}">
+                <a16:creationId xmlns:a16="http://schemas.microsoft.com/office/drawing/2014/main" id="{79588A93-E698-981D-64D9-4DDD1892F4B5}"/>
+              </a:ext>
+            </a:extLst>
+          </p:cNvPr>
+          <p:cNvSpPr txBox="1"/>
+          <p:nvPr/>
+        </p:nvSpPr>
+        <p:spPr>
+          <a:xfrm>
+            <a:off x="596931" y="5320903"/>
+            <a:ext cx="4823888" cy="1200329"/>
+          </a:xfrm>
+          <a:prstGeom prst="rect">
+            <a:avLst/>
+          </a:prstGeom>
+          <a:solidFill>
+            <a:schemeClr val="tx1"/>
+          </a:solidFill>
+        </p:spPr>
+        <p:txBody>
+          <a:bodyPr wrap="square" rtlCol="0">
+            <a:spAutoFit/>
+          </a:bodyPr>
+          <a:lstStyle/>
+          <a:p>
+            <a:r>
+              <a:rPr lang="en-US" b="1" dirty="0">
+                <a:solidFill>
+                  <a:schemeClr val="bg1"/>
+                </a:solidFill>
+              </a:rPr>
+              <a:t>$ Julia</a:t>
+            </a:r>
+          </a:p>
+          <a:p>
+            <a:r>
+              <a:rPr lang="en-US" b="1" dirty="0">
+                <a:solidFill>
+                  <a:schemeClr val="bg1"/>
+                </a:solidFill>
+              </a:rPr>
+              <a:t>…</a:t>
+            </a:r>
+          </a:p>
+          <a:p>
+            <a:r>
+              <a:rPr lang="en-US" b="1" dirty="0" err="1">
+                <a:solidFill>
+                  <a:schemeClr val="bg1"/>
+                </a:solidFill>
+              </a:rPr>
+              <a:t>julia</a:t>
+            </a:r>
+            <a:r>
+              <a:rPr lang="en-US" b="1" dirty="0">
+                <a:solidFill>
+                  <a:schemeClr val="bg1"/>
+                </a:solidFill>
+              </a:rPr>
+              <a:t>&gt; using </a:t>
+            </a:r>
+            <a:r>
+              <a:rPr lang="en-US" b="1" dirty="0" err="1">
+                <a:solidFill>
+                  <a:schemeClr val="bg1"/>
+                </a:solidFill>
+              </a:rPr>
+              <a:t>Ijulia</a:t>
+            </a:r>
+            <a:endParaRPr lang="en-US" b="1" dirty="0">
+              <a:solidFill>
+                <a:schemeClr val="bg1"/>
+              </a:solidFill>
+            </a:endParaRPr>
+          </a:p>
+          <a:p>
+            <a:r>
+              <a:rPr lang="en-US" b="1" dirty="0">
+                <a:solidFill>
+                  <a:schemeClr val="bg1"/>
+                </a:solidFill>
+              </a:rPr>
+              <a:t>Julia&gt; notebook()</a:t>
+            </a:r>
+          </a:p>
+        </p:txBody>
+      </p:sp>
+      <p:sp>
+        <p:nvSpPr>
+          <p:cNvPr id="7" name="TextBox 6">
+            <a:extLst>
+              <a:ext uri="{FF2B5EF4-FFF2-40B4-BE49-F238E27FC236}">
+                <a16:creationId xmlns:a16="http://schemas.microsoft.com/office/drawing/2014/main" id="{0360C775-60BD-E8FD-B0CF-766EFE9DCCB1}"/>
+              </a:ext>
+            </a:extLst>
+          </p:cNvPr>
+          <p:cNvSpPr txBox="1"/>
+          <p:nvPr/>
+        </p:nvSpPr>
+        <p:spPr>
+          <a:xfrm>
+            <a:off x="5747657" y="5715298"/>
+            <a:ext cx="3747308" cy="461665"/>
+          </a:xfrm>
+          <a:prstGeom prst="rect">
+            <a:avLst/>
+          </a:prstGeom>
+          <a:noFill/>
+          <a:ln>
+            <a:solidFill>
+              <a:schemeClr val="tx1"/>
+            </a:solidFill>
+          </a:ln>
+        </p:spPr>
+        <p:txBody>
+          <a:bodyPr wrap="none" rtlCol="0">
+            <a:spAutoFit/>
+          </a:bodyPr>
+          <a:lstStyle/>
+          <a:p>
+            <a:r>
+              <a:rPr lang="en-US" sz="2400" dirty="0"/>
+              <a:t>First time: will offer to install</a:t>
+            </a:r>
+          </a:p>
+        </p:txBody>
+      </p:sp>
+      <p:sp>
+        <p:nvSpPr>
+          <p:cNvPr id="9" name="TextBox 8">
+            <a:extLst>
+              <a:ext uri="{FF2B5EF4-FFF2-40B4-BE49-F238E27FC236}">
+                <a16:creationId xmlns:a16="http://schemas.microsoft.com/office/drawing/2014/main" id="{9281971C-AB02-B537-7F9F-C3D789C3072C}"/>
+              </a:ext>
+            </a:extLst>
+          </p:cNvPr>
+          <p:cNvSpPr txBox="1"/>
+          <p:nvPr/>
+        </p:nvSpPr>
+        <p:spPr>
+          <a:xfrm>
+            <a:off x="6771182" y="2308404"/>
+            <a:ext cx="4823888" cy="369332"/>
+          </a:xfrm>
+          <a:prstGeom prst="rect">
+            <a:avLst/>
+          </a:prstGeom>
+          <a:solidFill>
+            <a:schemeClr val="tx1"/>
+          </a:solidFill>
+        </p:spPr>
+        <p:txBody>
+          <a:bodyPr wrap="square" rtlCol="0">
+            <a:spAutoFit/>
+          </a:bodyPr>
+          <a:lstStyle/>
+          <a:p>
+            <a:r>
+              <a:rPr lang="en-US" b="1" dirty="0">
+                <a:solidFill>
+                  <a:schemeClr val="bg1"/>
+                </a:solidFill>
+              </a:rPr>
+              <a:t>$ Julia  </a:t>
+            </a:r>
+            <a:r>
+              <a:rPr lang="en-US" b="1" dirty="0" err="1">
+                <a:solidFill>
+                  <a:schemeClr val="bg1"/>
+                </a:solidFill>
+              </a:rPr>
+              <a:t>my_script.jl</a:t>
+            </a:r>
+            <a:endParaRPr lang="en-US" b="1" dirty="0">
+              <a:solidFill>
+                <a:schemeClr val="bg1"/>
+              </a:solidFill>
+            </a:endParaRPr>
+          </a:p>
+        </p:txBody>
+      </p:sp>
+    </p:spTree>
+    <p:extLst>
+      <p:ext uri="{BB962C8B-B14F-4D97-AF65-F5344CB8AC3E}">
+        <p14:creationId xmlns:p14="http://schemas.microsoft.com/office/powerpoint/2010/main" val="3149549582"/>
+      </p:ext>
+    </p:extLst>
+  </p:cSld>
+  <p:clrMapOvr>
+    <a:masterClrMapping/>
+  </p:clrMapOvr>
+  <p:timing>
+    <p:tnLst>
+      <p:par>
+        <p:cTn id="1" dur="indefinite" restart="never" nodeType="tmRoot">
+          <p:childTnLst>
+            <p:seq concurrent="1" nextAc="seek">
+              <p:cTn id="2" dur="indefinite" nodeType="mainSeq">
+                <p:childTnLst>
+                  <p:par>
+                    <p:cTn id="3" fill="hold">
+                      <p:stCondLst>
+                        <p:cond delay="indefinite"/>
+                        <p:cond evt="onBegin" delay="0">
+                          <p:tn val="2"/>
+                        </p:cond>
+                      </p:stCondLst>
+                      <p:childTnLst>
+                        <p:par>
+                          <p:cTn id="4" fill="hold">
+                            <p:stCondLst>
+                              <p:cond delay="0"/>
+                            </p:stCondLst>
+                            <p:childTnLst>
+                              <p:par>
+                                <p:cTn id="5" presetID="1" presetClass="entr" presetSubtype="0" fill="hold" grpId="0" nodeType="withEffect">
+                                  <p:stCondLst>
+                                    <p:cond delay="0"/>
+                                  </p:stCondLst>
+                                  <p:childTnLst>
+                                    <p:set>
+                                      <p:cBhvr>
+                                        <p:cTn id="6" dur="1" fill="hold">
+                                          <p:stCondLst>
+                                            <p:cond delay="0"/>
+                                          </p:stCondLst>
+                                        </p:cTn>
+                                        <p:tgtEl>
+                                          <p:spTgt spid="3">
+                                            <p:txEl>
+                                              <p:pRg st="0" end="0"/>
+                                            </p:txEl>
+                                          </p:spTgt>
+                                        </p:tgtEl>
+                                        <p:attrNameLst>
+                                          <p:attrName>style.visibility</p:attrName>
+                                        </p:attrNameLst>
+                                      </p:cBhvr>
+                                      <p:to>
+                                        <p:strVal val="visible"/>
+                                      </p:to>
+                                    </p:set>
+                                  </p:childTnLst>
+                                </p:cTn>
+                              </p:par>
+                            </p:childTnLst>
+                          </p:cTn>
+                        </p:par>
+                      </p:childTnLst>
+                    </p:cTn>
+                  </p:par>
+                  <p:par>
+                    <p:cTn id="7" fill="hold">
+                      <p:stCondLst>
+                        <p:cond delay="indefinite"/>
+                      </p:stCondLst>
+                      <p:childTnLst>
+                        <p:par>
+                          <p:cTn id="8" fill="hold">
+                            <p:stCondLst>
+                              <p:cond delay="0"/>
+                            </p:stCondLst>
+                            <p:childTnLst>
+                              <p:par>
+                                <p:cTn id="9" presetID="1" presetClass="entr" presetSubtype="0" fill="hold" grpId="0" nodeType="clickEffect">
+                                  <p:stCondLst>
+                                    <p:cond delay="0"/>
+                                  </p:stCondLst>
+                                  <p:childTnLst>
+                                    <p:set>
+                                      <p:cBhvr>
+                                        <p:cTn id="10" dur="1" fill="hold">
+                                          <p:stCondLst>
+                                            <p:cond delay="0"/>
+                                          </p:stCondLst>
+                                        </p:cTn>
+                                        <p:tgtEl>
+                                          <p:spTgt spid="3">
+                                            <p:txEl>
+                                              <p:pRg st="6" end="6"/>
+                                            </p:txEl>
+                                          </p:spTgt>
+                                        </p:tgtEl>
+                                        <p:attrNameLst>
+                                          <p:attrName>style.visibility</p:attrName>
+                                        </p:attrNameLst>
+                                      </p:cBhvr>
+                                      <p:to>
+                                        <p:strVal val="visible"/>
+                                      </p:to>
+                                    </p:set>
+                                  </p:childTnLst>
+                                </p:cTn>
+                              </p:par>
+                              <p:par>
+                                <p:cTn id="11" presetID="1" presetClass="entr" presetSubtype="0" fill="hold" grpId="0" nodeType="withEffect">
+                                  <p:stCondLst>
+                                    <p:cond delay="0"/>
+                                  </p:stCondLst>
+                                  <p:childTnLst>
+                                    <p:set>
+                                      <p:cBhvr>
+                                        <p:cTn id="12" dur="1" fill="hold">
+                                          <p:stCondLst>
+                                            <p:cond delay="0"/>
+                                          </p:stCondLst>
+                                        </p:cTn>
+                                        <p:tgtEl>
+                                          <p:spTgt spid="6"/>
+                                        </p:tgtEl>
+                                        <p:attrNameLst>
+                                          <p:attrName>style.visibility</p:attrName>
+                                        </p:attrNameLst>
+                                      </p:cBhvr>
+                                      <p:to>
+                                        <p:strVal val="visible"/>
+                                      </p:to>
+                                    </p:set>
+                                  </p:childTnLst>
+                                </p:cTn>
+                              </p:par>
+                            </p:childTnLst>
+                          </p:cTn>
+                        </p:par>
+                      </p:childTnLst>
+                    </p:cTn>
+                  </p:par>
+                  <p:par>
+                    <p:cTn id="13" fill="hold">
+                      <p:stCondLst>
+                        <p:cond delay="indefinite"/>
+                      </p:stCondLst>
+                      <p:childTnLst>
+                        <p:par>
+                          <p:cTn id="14" fill="hold">
+                            <p:stCondLst>
+                              <p:cond delay="0"/>
+                            </p:stCondLst>
+                            <p:childTnLst>
+                              <p:par>
+                                <p:cTn id="15" presetID="1" presetClass="entr" presetSubtype="0" fill="hold" grpId="0" nodeType="clickEffect">
+                                  <p:stCondLst>
+                                    <p:cond delay="0"/>
+                                  </p:stCondLst>
+                                  <p:childTnLst>
+                                    <p:set>
+                                      <p:cBhvr>
+                                        <p:cTn id="16" dur="1" fill="hold">
+                                          <p:stCondLst>
+                                            <p:cond delay="0"/>
+                                          </p:stCondLst>
+                                        </p:cTn>
+                                        <p:tgtEl>
+                                          <p:spTgt spid="7"/>
+                                        </p:tgtEl>
+                                        <p:attrNameLst>
+                                          <p:attrName>style.visibility</p:attrName>
+                                        </p:attrNameLst>
+                                      </p:cBhvr>
+                                      <p:to>
+                                        <p:strVal val="visible"/>
+                                      </p:to>
+                                    </p:set>
+                                  </p:childTnLst>
+                                </p:cTn>
+                              </p:par>
+                            </p:childTnLst>
+                          </p:cTn>
+                        </p:par>
+                      </p:childTnLst>
+                    </p:cTn>
+                  </p:par>
+                  <p:par>
+                    <p:cTn id="17" fill="hold">
+                      <p:stCondLst>
+                        <p:cond delay="indefinite"/>
+                      </p:stCondLst>
+                      <p:childTnLst>
+                        <p:par>
+                          <p:cTn id="18" fill="hold">
+                            <p:stCondLst>
+                              <p:cond delay="0"/>
+                            </p:stCondLst>
+                            <p:childTnLst>
+                              <p:par>
+                                <p:cTn id="19" presetID="1" presetClass="entr" presetSubtype="0" fill="hold" grpId="0" nodeType="clickEffect">
+                                  <p:stCondLst>
+                                    <p:cond delay="0"/>
+                                  </p:stCondLst>
+                                  <p:childTnLst>
+                                    <p:set>
+                                      <p:cBhvr>
+                                        <p:cTn id="20" dur="1" fill="hold">
+                                          <p:stCondLst>
+                                            <p:cond delay="0"/>
+                                          </p:stCondLst>
+                                        </p:cTn>
+                                        <p:tgtEl>
+                                          <p:spTgt spid="8">
+                                            <p:txEl>
+                                              <p:pRg st="0" end="0"/>
+                                            </p:txEl>
+                                          </p:spTgt>
+                                        </p:tgtEl>
+                                        <p:attrNameLst>
+                                          <p:attrName>style.visibility</p:attrName>
+                                        </p:attrNameLst>
+                                      </p:cBhvr>
+                                      <p:to>
+                                        <p:strVal val="visible"/>
+                                      </p:to>
+                                    </p:set>
+                                  </p:childTnLst>
+                                </p:cTn>
+                              </p:par>
+                              <p:par>
+                                <p:cTn id="21" presetID="1" presetClass="entr" presetSubtype="0" fill="hold" grpId="0" nodeType="withEffect">
+                                  <p:stCondLst>
+                                    <p:cond delay="0"/>
+                                  </p:stCondLst>
+                                  <p:childTnLst>
+                                    <p:set>
+                                      <p:cBhvr>
+                                        <p:cTn id="22" dur="1" fill="hold">
+                                          <p:stCondLst>
+                                            <p:cond delay="0"/>
+                                          </p:stCondLst>
+                                        </p:cTn>
+                                        <p:tgtEl>
+                                          <p:spTgt spid="9"/>
+                                        </p:tgtEl>
+                                        <p:attrNameLst>
+                                          <p:attrName>style.visibility</p:attrName>
+                                        </p:attrNameLst>
+                                      </p:cBhvr>
+                                      <p:to>
+                                        <p:strVal val="visible"/>
+                                      </p:to>
+                                    </p:set>
+                                  </p:childTnLst>
+                                </p:cTn>
+                              </p:par>
+                            </p:childTnLst>
+                          </p:cTn>
+                        </p:par>
+                      </p:childTnLst>
+                    </p:cTn>
+                  </p:par>
+                </p:childTnLst>
+              </p:cTn>
+              <p:prevCondLst>
+                <p:cond evt="onPrev" delay="0">
+                  <p:tgtEl>
+                    <p:sldTgt/>
+                  </p:tgtEl>
+                </p:cond>
+              </p:prevCondLst>
+              <p:nextCondLst>
+                <p:cond evt="onNext" delay="0">
+                  <p:tgtEl>
+                    <p:sldTgt/>
+                  </p:tgtEl>
+                </p:cond>
+              </p:nextCondLst>
+            </p:seq>
+          </p:childTnLst>
+        </p:cTn>
+      </p:par>
+    </p:tnLst>
+    <p:bldLst>
+      <p:bldP spid="3" grpId="0" uiExpand="1" build="p"/>
+      <p:bldP spid="8" grpId="0" build="p"/>
+      <p:bldP spid="6" grpId="0" animBg="1"/>
+      <p:bldP spid="7" grpId="0" animBg="1"/>
+      <p:bldP spid="9" grpId="0" animBg="1"/>
+    </p:bldLst>
+  </p:timing>
+</p:sld>
+</file>
+
+<file path=ppt/slides/slide7.xml><?xml version="1.0" encoding="utf-8"?>
+<p:sld xmlns:a="http://schemas.openxmlformats.org/drawingml/2006/main" xmlns:r="http://schemas.openxmlformats.org/officeDocument/2006/relationships" xmlns:p="http://schemas.openxmlformats.org/presentationml/2006/main">
+  <p:cSld>
+    <p:spTree>
+      <p:nvGrpSpPr>
+        <p:cNvPr id="1" name=""/>
+        <p:cNvGrpSpPr/>
+        <p:nvPr/>
+      </p:nvGrpSpPr>
+      <p:grpSpPr>
+        <a:xfrm>
+          <a:off x="0" y="0"/>
+          <a:ext cx="0" cy="0"/>
+          <a:chOff x="0" y="0"/>
+          <a:chExt cx="0" cy="0"/>
+        </a:xfrm>
+      </p:grpSpPr>
+      <p:sp>
+        <p:nvSpPr>
+          <p:cNvPr id="2" name="Title 1">
+            <a:extLst>
+              <a:ext uri="{FF2B5EF4-FFF2-40B4-BE49-F238E27FC236}">
                 <a16:creationId xmlns:a16="http://schemas.microsoft.com/office/drawing/2014/main" id="{52F16B82-69EF-47B1-8554-4134670A19CC}"/>
               </a:ext>
             </a:extLst>
@@ -32532,7 +33443,7 @@
           <a:p>
             <a:fld id="{78F7A1EC-23D1-431D-8C93-9C4ED5D4A04D}" type="slidenum">
               <a:rPr lang="en-US" smtClean="0"/>
-              <a:t>6</a:t>
+              <a:t>7</a:t>
             </a:fld>
             <a:endParaRPr lang="en-US"/>
           </a:p>
@@ -32551,7 +33462,7 @@
 </p:sld>
 </file>
 
-<file path=ppt/slides/slide7.xml><?xml version="1.0" encoding="utf-8"?>
+<file path=ppt/slides/slide8.xml><?xml version="1.0" encoding="utf-8"?>
 <p:sld xmlns:a="http://schemas.openxmlformats.org/drawingml/2006/main" xmlns:r="http://schemas.openxmlformats.org/officeDocument/2006/relationships" xmlns:p="http://schemas.openxmlformats.org/presentationml/2006/main">
   <p:cSld>
     <p:spTree>
@@ -32984,7 +33895,7 @@
           <a:p>
             <a:fld id="{78F7A1EC-23D1-431D-8C93-9C4ED5D4A04D}" type="slidenum">
               <a:rPr lang="en-US" smtClean="0"/>
-              <a:t>7</a:t>
+              <a:t>8</a:t>
             </a:fld>
             <a:endParaRPr lang="en-US"/>
           </a:p>
@@ -33731,7 +34642,7 @@
 </p:sld>
 </file>
 
-<file path=ppt/slides/slide8.xml><?xml version="1.0" encoding="utf-8"?>
+<file path=ppt/slides/slide9.xml><?xml version="1.0" encoding="utf-8"?>
 <p:sld xmlns:a="http://schemas.openxmlformats.org/drawingml/2006/main" xmlns:r="http://schemas.openxmlformats.org/officeDocument/2006/relationships" xmlns:p="http://schemas.openxmlformats.org/presentationml/2006/main">
   <p:cSld>
     <p:spTree>
@@ -33967,7 +34878,7 @@
           <a:p>
             <a:fld id="{78F7A1EC-23D1-431D-8C93-9C4ED5D4A04D}" type="slidenum">
               <a:rPr lang="en-US" smtClean="0"/>
-              <a:t>8</a:t>
+              <a:t>9</a:t>
             </a:fld>
             <a:endParaRPr lang="en-US"/>
           </a:p>
@@ -34744,118 +35655,6 @@
 </p:sld>
 </file>
 
-<file path=ppt/slides/slide9.xml><?xml version="1.0" encoding="utf-8"?>
-<p:sld xmlns:a="http://schemas.openxmlformats.org/drawingml/2006/main" xmlns:r="http://schemas.openxmlformats.org/officeDocument/2006/relationships" xmlns:p="http://schemas.openxmlformats.org/presentationml/2006/main">
-  <p:cSld>
-    <p:spTree>
-      <p:nvGrpSpPr>
-        <p:cNvPr id="1" name=""/>
-        <p:cNvGrpSpPr/>
-        <p:nvPr/>
-      </p:nvGrpSpPr>
-      <p:grpSpPr>
-        <a:xfrm>
-          <a:off x="0" y="0"/>
-          <a:ext cx="0" cy="0"/>
-          <a:chOff x="0" y="0"/>
-          <a:chExt cx="0" cy="0"/>
-        </a:xfrm>
-      </p:grpSpPr>
-      <p:sp>
-        <p:nvSpPr>
-          <p:cNvPr id="2" name="Title 1">
-            <a:extLst>
-              <a:ext uri="{FF2B5EF4-FFF2-40B4-BE49-F238E27FC236}">
-                <a16:creationId xmlns:a16="http://schemas.microsoft.com/office/drawing/2014/main" id="{5996CC12-00C7-483E-8CFF-7965D13CF81D}"/>
-              </a:ext>
-            </a:extLst>
-          </p:cNvPr>
-          <p:cNvSpPr>
-            <a:spLocks noGrp="1"/>
-          </p:cNvSpPr>
-          <p:nvPr>
-            <p:ph type="title"/>
-          </p:nvPr>
-        </p:nvSpPr>
-        <p:spPr/>
-        <p:txBody>
-          <a:bodyPr/>
-          <a:lstStyle/>
-          <a:p>
-            <a:r>
-              <a:rPr lang="en-US" dirty="0"/>
-              <a:t>Functions &amp; methods</a:t>
-            </a:r>
-          </a:p>
-        </p:txBody>
-      </p:sp>
-      <p:sp>
-        <p:nvSpPr>
-          <p:cNvPr id="3" name="Text Placeholder 2">
-            <a:extLst>
-              <a:ext uri="{FF2B5EF4-FFF2-40B4-BE49-F238E27FC236}">
-                <a16:creationId xmlns:a16="http://schemas.microsoft.com/office/drawing/2014/main" id="{4DBA96D6-590F-4DFD-8B92-2B05EA00B8D6}"/>
-              </a:ext>
-            </a:extLst>
-          </p:cNvPr>
-          <p:cNvSpPr>
-            <a:spLocks noGrp="1"/>
-          </p:cNvSpPr>
-          <p:nvPr>
-            <p:ph type="body" idx="1"/>
-          </p:nvPr>
-        </p:nvSpPr>
-        <p:spPr/>
-        <p:txBody>
-          <a:bodyPr/>
-          <a:lstStyle/>
-          <a:p>
-            <a:endParaRPr lang="en-US"/>
-          </a:p>
-        </p:txBody>
-      </p:sp>
-      <p:sp>
-        <p:nvSpPr>
-          <p:cNvPr id="4" name="Slide Number Placeholder 3">
-            <a:extLst>
-              <a:ext uri="{FF2B5EF4-FFF2-40B4-BE49-F238E27FC236}">
-                <a16:creationId xmlns:a16="http://schemas.microsoft.com/office/drawing/2014/main" id="{D4FDC261-61BA-4399-84EE-BBD1B46F99D2}"/>
-              </a:ext>
-            </a:extLst>
-          </p:cNvPr>
-          <p:cNvSpPr>
-            <a:spLocks noGrp="1"/>
-          </p:cNvSpPr>
-          <p:nvPr>
-            <p:ph type="sldNum" sz="quarter" idx="12"/>
-          </p:nvPr>
-        </p:nvSpPr>
-        <p:spPr/>
-        <p:txBody>
-          <a:bodyPr/>
-          <a:lstStyle/>
-          <a:p>
-            <a:fld id="{78F7A1EC-23D1-431D-8C93-9C4ED5D4A04D}" type="slidenum">
-              <a:rPr lang="en-US" smtClean="0"/>
-              <a:t>9</a:t>
-            </a:fld>
-            <a:endParaRPr lang="en-US"/>
-          </a:p>
-        </p:txBody>
-      </p:sp>
-    </p:spTree>
-    <p:extLst>
-      <p:ext uri="{BB962C8B-B14F-4D97-AF65-F5344CB8AC3E}">
-        <p14:creationId xmlns:p14="http://schemas.microsoft.com/office/powerpoint/2010/main" val="322722320"/>
-      </p:ext>
-    </p:extLst>
-  </p:cSld>
-  <p:clrMapOvr>
-    <a:masterClrMapping/>
-  </p:clrMapOvr>
-</p:sld>
-</file>
-
 <file path=ppt/theme/theme1.xml><?xml version="1.0" encoding="utf-8"?>
 <a:theme xmlns:a="http://schemas.openxmlformats.org/drawingml/2006/main" name="Office Theme">
   <a:themeElements>

</xml_diff>

<commit_message>
Fix code indendation in module
</commit_message>
<xml_diff>
--- a/julia_good_back_ugly.pptx
+++ b/julia_good_back_ugly.pptx
@@ -26219,7 +26219,7 @@
                 <a:rPr lang="en-US" dirty="0">
                   <a:latin typeface="Consolas" panose="020B0609020204030204" pitchFamily="49" charset="0"/>
                 </a:rPr>
-                <a:t>export </a:t>
+                <a:t>  export </a:t>
               </a:r>
               <a:r>
                 <a:rPr lang="en-US" dirty="0">
@@ -26241,7 +26241,7 @@
                 <a:rPr lang="en-US" dirty="0">
                   <a:latin typeface="Consolas" panose="020B0609020204030204" pitchFamily="49" charset="0"/>
                 </a:rPr>
-                <a:t>function </a:t>
+                <a:t>  function </a:t>
               </a:r>
               <a:r>
                 <a:rPr lang="en-US" dirty="0">
@@ -26272,7 +26272,7 @@
                 <a:rPr lang="en-US" dirty="0">
                   <a:latin typeface="Consolas" panose="020B0609020204030204" pitchFamily="49" charset="0"/>
                 </a:rPr>
-                <a:t>end</a:t>
+                <a:t>  end</a:t>
               </a:r>
             </a:p>
             <a:p>
@@ -26285,7 +26285,7 @@
                 <a:rPr lang="en-US" dirty="0">
                   <a:latin typeface="Consolas" panose="020B0609020204030204" pitchFamily="49" charset="0"/>
                 </a:rPr>
-                <a:t>function </a:t>
+                <a:t>  function </a:t>
               </a:r>
               <a:r>
                 <a:rPr lang="en-US" b="1" dirty="0" err="1">
@@ -26316,7 +26316,7 @@
                 <a:rPr lang="en-US" dirty="0">
                   <a:latin typeface="Consolas" panose="020B0609020204030204" pitchFamily="49" charset="0"/>
                 </a:rPr>
-                <a:t>end</a:t>
+                <a:t>  end</a:t>
               </a:r>
             </a:p>
             <a:p>

</xml_diff>

<commit_message>
Add remark to get into and out of package manager
</commit_message>
<xml_diff>
--- a/julia_good_back_ugly.pptx
+++ b/julia_good_back_ugly.pptx
@@ -29515,6 +29515,56 @@
                 <a:latin typeface="Consolas" panose="020B0609020204030204" pitchFamily="49" charset="0"/>
               </a:rPr>
               <a:t>JULIA_LOAD_PATH</a:t>
+            </a:r>
+          </a:p>
+        </p:txBody>
+      </p:sp>
+      <p:sp>
+        <p:nvSpPr>
+          <p:cNvPr id="13" name="TextBox 12">
+            <a:extLst>
+              <a:ext uri="{FF2B5EF4-FFF2-40B4-BE49-F238E27FC236}">
+                <a16:creationId xmlns:a16="http://schemas.microsoft.com/office/drawing/2014/main" id="{327FA76A-6CC9-066F-5709-728D0AD50273}"/>
+              </a:ext>
+            </a:extLst>
+          </p:cNvPr>
+          <p:cNvSpPr txBox="1"/>
+          <p:nvPr/>
+        </p:nvSpPr>
+        <p:spPr>
+          <a:xfrm>
+            <a:off x="4870808" y="2041369"/>
+            <a:ext cx="5006307" cy="707886"/>
+          </a:xfrm>
+          <a:prstGeom prst="rect">
+            <a:avLst/>
+          </a:prstGeom>
+          <a:noFill/>
+          <a:ln>
+            <a:solidFill>
+              <a:schemeClr val="tx1"/>
+            </a:solidFill>
+          </a:ln>
+        </p:spPr>
+        <p:txBody>
+          <a:bodyPr wrap="none" rtlCol="0">
+            <a:spAutoFit/>
+          </a:bodyPr>
+          <a:lstStyle/>
+          <a:p>
+            <a:r>
+              <a:rPr lang="en-US" sz="2000" dirty="0"/>
+              <a:t>Get into package manager by pressing </a:t>
+            </a:r>
+            <a:r>
+              <a:rPr lang="en-US" sz="2000" b="1" dirty="0"/>
+              <a:t>]</a:t>
+            </a:r>
+          </a:p>
+          <a:p>
+            <a:r>
+              <a:rPr lang="en-US" sz="2000" dirty="0"/>
+              <a:t>Get out of package manager by pressing Ctrl-C</a:t>
             </a:r>
           </a:p>
         </p:txBody>

</xml_diff>